<commit_message>
update (deep copy figure)
</commit_message>
<xml_diff>
--- a/notebooks/interactions.pptx
+++ b/notebooks/interactions.pptx
@@ -4,10 +4,17 @@
   <p:sldMasterIdLst>
     <p:sldMasterId id="2147483648" r:id="rId1"/>
   </p:sldMasterIdLst>
+  <p:notesMasterIdLst>
+    <p:notesMasterId r:id="rId9"/>
+  </p:notesMasterIdLst>
   <p:sldIdLst>
     <p:sldId id="256" r:id="rId2"/>
     <p:sldId id="257" r:id="rId3"/>
     <p:sldId id="258" r:id="rId4"/>
+    <p:sldId id="259" r:id="rId5"/>
+    <p:sldId id="260" r:id="rId6"/>
+    <p:sldId id="261" r:id="rId7"/>
+    <p:sldId id="262" r:id="rId8"/>
   </p:sldIdLst>
   <p:sldSz cx="12192000" cy="6858000"/>
   <p:notesSz cx="6858000" cy="9144000"/>
@@ -106,7 +113,446 @@
       </a:defRPr>
     </a:lvl9pPr>
   </p:defaultTextStyle>
+  <p:extLst>
+    <p:ext uri="{EFAFB233-063F-42B5-8137-9DF3F51BA10A}">
+      <p15:sldGuideLst xmlns:p15="http://schemas.microsoft.com/office/powerpoint/2012/main"/>
+    </p:ext>
+  </p:extLst>
 </p:presentation>
+</file>
+
+<file path=ppt/notesMasters/notesMaster1.xml><?xml version="1.0" encoding="utf-8"?>
+<p:notesMaster xmlns:a="http://schemas.openxmlformats.org/drawingml/2006/main" xmlns:r="http://schemas.openxmlformats.org/officeDocument/2006/relationships" xmlns:p="http://schemas.openxmlformats.org/presentationml/2006/main">
+  <p:cSld>
+    <p:bg>
+      <p:bgRef idx="1001">
+        <a:schemeClr val="bg1"/>
+      </p:bgRef>
+    </p:bg>
+    <p:spTree>
+      <p:nvGrpSpPr>
+        <p:cNvPr id="1" name=""/>
+        <p:cNvGrpSpPr/>
+        <p:nvPr/>
+      </p:nvGrpSpPr>
+      <p:grpSpPr>
+        <a:xfrm>
+          <a:off x="0" y="0"/>
+          <a:ext cx="0" cy="0"/>
+          <a:chOff x="0" y="0"/>
+          <a:chExt cx="0" cy="0"/>
+        </a:xfrm>
+      </p:grpSpPr>
+      <p:sp>
+        <p:nvSpPr>
+          <p:cNvPr id="2" name="Header Placeholder 1"/>
+          <p:cNvSpPr>
+            <a:spLocks noGrp="1"/>
+          </p:cNvSpPr>
+          <p:nvPr>
+            <p:ph type="hdr" sz="quarter"/>
+          </p:nvPr>
+        </p:nvSpPr>
+        <p:spPr>
+          <a:xfrm>
+            <a:off x="0" y="0"/>
+            <a:ext cx="2971800" cy="458788"/>
+          </a:xfrm>
+          <a:prstGeom prst="rect">
+            <a:avLst/>
+          </a:prstGeom>
+        </p:spPr>
+        <p:txBody>
+          <a:bodyPr vert="horz" lIns="91440" tIns="45720" rIns="91440" bIns="45720" rtlCol="0"/>
+          <a:lstStyle>
+            <a:lvl1pPr algn="l">
+              <a:defRPr sz="1200"/>
+            </a:lvl1pPr>
+          </a:lstStyle>
+          <a:p>
+            <a:endParaRPr lang="de-DE"/>
+          </a:p>
+        </p:txBody>
+      </p:sp>
+      <p:sp>
+        <p:nvSpPr>
+          <p:cNvPr id="3" name="Date Placeholder 2"/>
+          <p:cNvSpPr>
+            <a:spLocks noGrp="1"/>
+          </p:cNvSpPr>
+          <p:nvPr>
+            <p:ph type="dt" idx="1"/>
+          </p:nvPr>
+        </p:nvSpPr>
+        <p:spPr>
+          <a:xfrm>
+            <a:off x="3884613" y="0"/>
+            <a:ext cx="2971800" cy="458788"/>
+          </a:xfrm>
+          <a:prstGeom prst="rect">
+            <a:avLst/>
+          </a:prstGeom>
+        </p:spPr>
+        <p:txBody>
+          <a:bodyPr vert="horz" lIns="91440" tIns="45720" rIns="91440" bIns="45720" rtlCol="0"/>
+          <a:lstStyle>
+            <a:lvl1pPr algn="r">
+              <a:defRPr sz="1200"/>
+            </a:lvl1pPr>
+          </a:lstStyle>
+          <a:p>
+            <a:fld id="{C7DD7C40-6D7B-4043-B912-EF37514A7BAF}" type="datetimeFigureOut">
+              <a:rPr lang="de-DE" smtClean="0"/>
+              <a:t>09.11.20</a:t>
+            </a:fld>
+            <a:endParaRPr lang="de-DE"/>
+          </a:p>
+        </p:txBody>
+      </p:sp>
+      <p:sp>
+        <p:nvSpPr>
+          <p:cNvPr id="4" name="Slide Image Placeholder 3"/>
+          <p:cNvSpPr>
+            <a:spLocks noGrp="1" noRot="1" noChangeAspect="1"/>
+          </p:cNvSpPr>
+          <p:nvPr>
+            <p:ph type="sldImg" idx="2"/>
+          </p:nvPr>
+        </p:nvSpPr>
+        <p:spPr>
+          <a:xfrm>
+            <a:off x="685800" y="1143000"/>
+            <a:ext cx="5486400" cy="3086100"/>
+          </a:xfrm>
+          <a:prstGeom prst="rect">
+            <a:avLst/>
+          </a:prstGeom>
+          <a:noFill/>
+          <a:ln w="12700">
+            <a:solidFill>
+              <a:prstClr val="black"/>
+            </a:solidFill>
+          </a:ln>
+        </p:spPr>
+        <p:txBody>
+          <a:bodyPr vert="horz" lIns="91440" tIns="45720" rIns="91440" bIns="45720" rtlCol="0" anchor="ctr"/>
+          <a:lstStyle/>
+          <a:p>
+            <a:endParaRPr lang="de-DE"/>
+          </a:p>
+        </p:txBody>
+      </p:sp>
+      <p:sp>
+        <p:nvSpPr>
+          <p:cNvPr id="5" name="Notes Placeholder 4"/>
+          <p:cNvSpPr>
+            <a:spLocks noGrp="1"/>
+          </p:cNvSpPr>
+          <p:nvPr>
+            <p:ph type="body" sz="quarter" idx="3"/>
+          </p:nvPr>
+        </p:nvSpPr>
+        <p:spPr>
+          <a:xfrm>
+            <a:off x="685800" y="4400550"/>
+            <a:ext cx="5486400" cy="3600450"/>
+          </a:xfrm>
+          <a:prstGeom prst="rect">
+            <a:avLst/>
+          </a:prstGeom>
+        </p:spPr>
+        <p:txBody>
+          <a:bodyPr vert="horz" lIns="91440" tIns="45720" rIns="91440" bIns="45720" rtlCol="0"/>
+          <a:lstStyle/>
+          <a:p>
+            <a:pPr lvl="0"/>
+            <a:r>
+              <a:rPr lang="en-US"/>
+              <a:t>Click to edit Master text styles</a:t>
+            </a:r>
+          </a:p>
+          <a:p>
+            <a:pPr lvl="1"/>
+            <a:r>
+              <a:rPr lang="en-US"/>
+              <a:t>Second level</a:t>
+            </a:r>
+          </a:p>
+          <a:p>
+            <a:pPr lvl="2"/>
+            <a:r>
+              <a:rPr lang="en-US"/>
+              <a:t>Third level</a:t>
+            </a:r>
+          </a:p>
+          <a:p>
+            <a:pPr lvl="3"/>
+            <a:r>
+              <a:rPr lang="en-US"/>
+              <a:t>Fourth level</a:t>
+            </a:r>
+          </a:p>
+          <a:p>
+            <a:pPr lvl="4"/>
+            <a:r>
+              <a:rPr lang="en-US"/>
+              <a:t>Fifth level</a:t>
+            </a:r>
+            <a:endParaRPr lang="de-DE"/>
+          </a:p>
+        </p:txBody>
+      </p:sp>
+      <p:sp>
+        <p:nvSpPr>
+          <p:cNvPr id="6" name="Footer Placeholder 5"/>
+          <p:cNvSpPr>
+            <a:spLocks noGrp="1"/>
+          </p:cNvSpPr>
+          <p:nvPr>
+            <p:ph type="ftr" sz="quarter" idx="4"/>
+          </p:nvPr>
+        </p:nvSpPr>
+        <p:spPr>
+          <a:xfrm>
+            <a:off x="0" y="8685213"/>
+            <a:ext cx="2971800" cy="458787"/>
+          </a:xfrm>
+          <a:prstGeom prst="rect">
+            <a:avLst/>
+          </a:prstGeom>
+        </p:spPr>
+        <p:txBody>
+          <a:bodyPr vert="horz" lIns="91440" tIns="45720" rIns="91440" bIns="45720" rtlCol="0" anchor="b"/>
+          <a:lstStyle>
+            <a:lvl1pPr algn="l">
+              <a:defRPr sz="1200"/>
+            </a:lvl1pPr>
+          </a:lstStyle>
+          <a:p>
+            <a:endParaRPr lang="de-DE"/>
+          </a:p>
+        </p:txBody>
+      </p:sp>
+      <p:sp>
+        <p:nvSpPr>
+          <p:cNvPr id="7" name="Slide Number Placeholder 6"/>
+          <p:cNvSpPr>
+            <a:spLocks noGrp="1"/>
+          </p:cNvSpPr>
+          <p:nvPr>
+            <p:ph type="sldNum" sz="quarter" idx="5"/>
+          </p:nvPr>
+        </p:nvSpPr>
+        <p:spPr>
+          <a:xfrm>
+            <a:off x="3884613" y="8685213"/>
+            <a:ext cx="2971800" cy="458787"/>
+          </a:xfrm>
+          <a:prstGeom prst="rect">
+            <a:avLst/>
+          </a:prstGeom>
+        </p:spPr>
+        <p:txBody>
+          <a:bodyPr vert="horz" lIns="91440" tIns="45720" rIns="91440" bIns="45720" rtlCol="0" anchor="b"/>
+          <a:lstStyle>
+            <a:lvl1pPr algn="r">
+              <a:defRPr sz="1200"/>
+            </a:lvl1pPr>
+          </a:lstStyle>
+          <a:p>
+            <a:fld id="{42345F5C-D2D3-E344-A72A-B34A1232694A}" type="slidenum">
+              <a:rPr lang="de-DE" smtClean="0"/>
+              <a:t>‹#›</a:t>
+            </a:fld>
+            <a:endParaRPr lang="de-DE"/>
+          </a:p>
+        </p:txBody>
+      </p:sp>
+    </p:spTree>
+    <p:extLst>
+      <p:ext uri="{BB962C8B-B14F-4D97-AF65-F5344CB8AC3E}">
+        <p14:creationId xmlns:p14="http://schemas.microsoft.com/office/powerpoint/2010/main" val="1893758117"/>
+      </p:ext>
+    </p:extLst>
+  </p:cSld>
+  <p:clrMap bg1="lt1" tx1="dk1" bg2="lt2" tx2="dk2" accent1="accent1" accent2="accent2" accent3="accent3" accent4="accent4" accent5="accent5" accent6="accent6" hlink="hlink" folHlink="folHlink"/>
+  <p:notesStyle>
+    <a:lvl1pPr marL="0" algn="l" defTabSz="914400" rtl="0" eaLnBrk="1" latinLnBrk="0" hangingPunct="1">
+      <a:defRPr sz="1200" kern="1200">
+        <a:solidFill>
+          <a:schemeClr val="tx1"/>
+        </a:solidFill>
+        <a:latin typeface="+mn-lt"/>
+        <a:ea typeface="+mn-ea"/>
+        <a:cs typeface="+mn-cs"/>
+      </a:defRPr>
+    </a:lvl1pPr>
+    <a:lvl2pPr marL="457200" algn="l" defTabSz="914400" rtl="0" eaLnBrk="1" latinLnBrk="0" hangingPunct="1">
+      <a:defRPr sz="1200" kern="1200">
+        <a:solidFill>
+          <a:schemeClr val="tx1"/>
+        </a:solidFill>
+        <a:latin typeface="+mn-lt"/>
+        <a:ea typeface="+mn-ea"/>
+        <a:cs typeface="+mn-cs"/>
+      </a:defRPr>
+    </a:lvl2pPr>
+    <a:lvl3pPr marL="914400" algn="l" defTabSz="914400" rtl="0" eaLnBrk="1" latinLnBrk="0" hangingPunct="1">
+      <a:defRPr sz="1200" kern="1200">
+        <a:solidFill>
+          <a:schemeClr val="tx1"/>
+        </a:solidFill>
+        <a:latin typeface="+mn-lt"/>
+        <a:ea typeface="+mn-ea"/>
+        <a:cs typeface="+mn-cs"/>
+      </a:defRPr>
+    </a:lvl3pPr>
+    <a:lvl4pPr marL="1371600" algn="l" defTabSz="914400" rtl="0" eaLnBrk="1" latinLnBrk="0" hangingPunct="1">
+      <a:defRPr sz="1200" kern="1200">
+        <a:solidFill>
+          <a:schemeClr val="tx1"/>
+        </a:solidFill>
+        <a:latin typeface="+mn-lt"/>
+        <a:ea typeface="+mn-ea"/>
+        <a:cs typeface="+mn-cs"/>
+      </a:defRPr>
+    </a:lvl4pPr>
+    <a:lvl5pPr marL="1828800" algn="l" defTabSz="914400" rtl="0" eaLnBrk="1" latinLnBrk="0" hangingPunct="1">
+      <a:defRPr sz="1200" kern="1200">
+        <a:solidFill>
+          <a:schemeClr val="tx1"/>
+        </a:solidFill>
+        <a:latin typeface="+mn-lt"/>
+        <a:ea typeface="+mn-ea"/>
+        <a:cs typeface="+mn-cs"/>
+      </a:defRPr>
+    </a:lvl5pPr>
+    <a:lvl6pPr marL="2286000" algn="l" defTabSz="914400" rtl="0" eaLnBrk="1" latinLnBrk="0" hangingPunct="1">
+      <a:defRPr sz="1200" kern="1200">
+        <a:solidFill>
+          <a:schemeClr val="tx1"/>
+        </a:solidFill>
+        <a:latin typeface="+mn-lt"/>
+        <a:ea typeface="+mn-ea"/>
+        <a:cs typeface="+mn-cs"/>
+      </a:defRPr>
+    </a:lvl6pPr>
+    <a:lvl7pPr marL="2743200" algn="l" defTabSz="914400" rtl="0" eaLnBrk="1" latinLnBrk="0" hangingPunct="1">
+      <a:defRPr sz="1200" kern="1200">
+        <a:solidFill>
+          <a:schemeClr val="tx1"/>
+        </a:solidFill>
+        <a:latin typeface="+mn-lt"/>
+        <a:ea typeface="+mn-ea"/>
+        <a:cs typeface="+mn-cs"/>
+      </a:defRPr>
+    </a:lvl7pPr>
+    <a:lvl8pPr marL="3200400" algn="l" defTabSz="914400" rtl="0" eaLnBrk="1" latinLnBrk="0" hangingPunct="1">
+      <a:defRPr sz="1200" kern="1200">
+        <a:solidFill>
+          <a:schemeClr val="tx1"/>
+        </a:solidFill>
+        <a:latin typeface="+mn-lt"/>
+        <a:ea typeface="+mn-ea"/>
+        <a:cs typeface="+mn-cs"/>
+      </a:defRPr>
+    </a:lvl8pPr>
+    <a:lvl9pPr marL="3657600" algn="l" defTabSz="914400" rtl="0" eaLnBrk="1" latinLnBrk="0" hangingPunct="1">
+      <a:defRPr sz="1200" kern="1200">
+        <a:solidFill>
+          <a:schemeClr val="tx1"/>
+        </a:solidFill>
+        <a:latin typeface="+mn-lt"/>
+        <a:ea typeface="+mn-ea"/>
+        <a:cs typeface="+mn-cs"/>
+      </a:defRPr>
+    </a:lvl9pPr>
+  </p:notesStyle>
+</p:notesMaster>
+</file>
+
+<file path=ppt/notesSlides/notesSlide1.xml><?xml version="1.0" encoding="utf-8"?>
+<p:notes xmlns:a="http://schemas.openxmlformats.org/drawingml/2006/main" xmlns:r="http://schemas.openxmlformats.org/officeDocument/2006/relationships" xmlns:p="http://schemas.openxmlformats.org/presentationml/2006/main">
+  <p:cSld>
+    <p:spTree>
+      <p:nvGrpSpPr>
+        <p:cNvPr id="1" name=""/>
+        <p:cNvGrpSpPr/>
+        <p:nvPr/>
+      </p:nvGrpSpPr>
+      <p:grpSpPr>
+        <a:xfrm>
+          <a:off x="0" y="0"/>
+          <a:ext cx="0" cy="0"/>
+          <a:chOff x="0" y="0"/>
+          <a:chExt cx="0" cy="0"/>
+        </a:xfrm>
+      </p:grpSpPr>
+      <p:sp>
+        <p:nvSpPr>
+          <p:cNvPr id="2" name="Slide Image Placeholder 1"/>
+          <p:cNvSpPr>
+            <a:spLocks noGrp="1" noRot="1" noChangeAspect="1"/>
+          </p:cNvSpPr>
+          <p:nvPr>
+            <p:ph type="sldImg"/>
+          </p:nvPr>
+        </p:nvSpPr>
+        <p:spPr/>
+      </p:sp>
+      <p:sp>
+        <p:nvSpPr>
+          <p:cNvPr id="3" name="Notes Placeholder 2"/>
+          <p:cNvSpPr>
+            <a:spLocks noGrp="1"/>
+          </p:cNvSpPr>
+          <p:nvPr>
+            <p:ph type="body" idx="1"/>
+          </p:nvPr>
+        </p:nvSpPr>
+        <p:spPr/>
+        <p:txBody>
+          <a:bodyPr/>
+          <a:lstStyle/>
+          <a:p>
+            <a:endParaRPr lang="de-DE" dirty="0"/>
+          </a:p>
+        </p:txBody>
+      </p:sp>
+      <p:sp>
+        <p:nvSpPr>
+          <p:cNvPr id="4" name="Slide Number Placeholder 3"/>
+          <p:cNvSpPr>
+            <a:spLocks noGrp="1"/>
+          </p:cNvSpPr>
+          <p:nvPr>
+            <p:ph type="sldNum" sz="quarter" idx="5"/>
+          </p:nvPr>
+        </p:nvSpPr>
+        <p:spPr/>
+        <p:txBody>
+          <a:bodyPr/>
+          <a:lstStyle/>
+          <a:p>
+            <a:fld id="{42345F5C-D2D3-E344-A72A-B34A1232694A}" type="slidenum">
+              <a:rPr lang="de-DE" smtClean="0"/>
+              <a:t>6</a:t>
+            </a:fld>
+            <a:endParaRPr lang="de-DE"/>
+          </a:p>
+        </p:txBody>
+      </p:sp>
+    </p:spTree>
+    <p:extLst>
+      <p:ext uri="{BB962C8B-B14F-4D97-AF65-F5344CB8AC3E}">
+        <p14:creationId xmlns:p14="http://schemas.microsoft.com/office/powerpoint/2010/main" val="2914118922"/>
+      </p:ext>
+    </p:extLst>
+  </p:cSld>
+  <p:clrMapOvr>
+    <a:masterClrMapping/>
+  </p:clrMapOvr>
+</p:notes>
 </file>
 
 <file path=ppt/slideLayouts/slideLayout1.xml><?xml version="1.0" encoding="utf-8"?>
@@ -258,7 +704,7 @@
           <a:p>
             <a:fld id="{AC2D5F89-5D9A-AC47-B53A-AD027F6E2895}" type="datetimeFigureOut">
               <a:rPr lang="de-DE" smtClean="0"/>
-              <a:t>29.04.20</a:t>
+              <a:t>09.11.20</a:t>
             </a:fld>
             <a:endParaRPr lang="de-DE"/>
           </a:p>
@@ -458,7 +904,7 @@
           <a:p>
             <a:fld id="{AC2D5F89-5D9A-AC47-B53A-AD027F6E2895}" type="datetimeFigureOut">
               <a:rPr lang="de-DE" smtClean="0"/>
-              <a:t>29.04.20</a:t>
+              <a:t>09.11.20</a:t>
             </a:fld>
             <a:endParaRPr lang="de-DE"/>
           </a:p>
@@ -668,7 +1114,7 @@
           <a:p>
             <a:fld id="{AC2D5F89-5D9A-AC47-B53A-AD027F6E2895}" type="datetimeFigureOut">
               <a:rPr lang="de-DE" smtClean="0"/>
-              <a:t>29.04.20</a:t>
+              <a:t>09.11.20</a:t>
             </a:fld>
             <a:endParaRPr lang="de-DE"/>
           </a:p>
@@ -868,7 +1314,7 @@
           <a:p>
             <a:fld id="{AC2D5F89-5D9A-AC47-B53A-AD027F6E2895}" type="datetimeFigureOut">
               <a:rPr lang="de-DE" smtClean="0"/>
-              <a:t>29.04.20</a:t>
+              <a:t>09.11.20</a:t>
             </a:fld>
             <a:endParaRPr lang="de-DE"/>
           </a:p>
@@ -1144,7 +1590,7 @@
           <a:p>
             <a:fld id="{AC2D5F89-5D9A-AC47-B53A-AD027F6E2895}" type="datetimeFigureOut">
               <a:rPr lang="de-DE" smtClean="0"/>
-              <a:t>29.04.20</a:t>
+              <a:t>09.11.20</a:t>
             </a:fld>
             <a:endParaRPr lang="de-DE"/>
           </a:p>
@@ -1412,7 +1858,7 @@
           <a:p>
             <a:fld id="{AC2D5F89-5D9A-AC47-B53A-AD027F6E2895}" type="datetimeFigureOut">
               <a:rPr lang="de-DE" smtClean="0"/>
-              <a:t>29.04.20</a:t>
+              <a:t>09.11.20</a:t>
             </a:fld>
             <a:endParaRPr lang="de-DE"/>
           </a:p>
@@ -1827,7 +2273,7 @@
           <a:p>
             <a:fld id="{AC2D5F89-5D9A-AC47-B53A-AD027F6E2895}" type="datetimeFigureOut">
               <a:rPr lang="de-DE" smtClean="0"/>
-              <a:t>29.04.20</a:t>
+              <a:t>09.11.20</a:t>
             </a:fld>
             <a:endParaRPr lang="de-DE"/>
           </a:p>
@@ -1969,7 +2415,7 @@
           <a:p>
             <a:fld id="{AC2D5F89-5D9A-AC47-B53A-AD027F6E2895}" type="datetimeFigureOut">
               <a:rPr lang="de-DE" smtClean="0"/>
-              <a:t>29.04.20</a:t>
+              <a:t>09.11.20</a:t>
             </a:fld>
             <a:endParaRPr lang="de-DE"/>
           </a:p>
@@ -2082,7 +2528,7 @@
           <a:p>
             <a:fld id="{AC2D5F89-5D9A-AC47-B53A-AD027F6E2895}" type="datetimeFigureOut">
               <a:rPr lang="de-DE" smtClean="0"/>
-              <a:t>29.04.20</a:t>
+              <a:t>09.11.20</a:t>
             </a:fld>
             <a:endParaRPr lang="de-DE"/>
           </a:p>
@@ -2395,7 +2841,7 @@
           <a:p>
             <a:fld id="{AC2D5F89-5D9A-AC47-B53A-AD027F6E2895}" type="datetimeFigureOut">
               <a:rPr lang="de-DE" smtClean="0"/>
-              <a:t>29.04.20</a:t>
+              <a:t>09.11.20</a:t>
             </a:fld>
             <a:endParaRPr lang="de-DE"/>
           </a:p>
@@ -2684,7 +3130,7 @@
           <a:p>
             <a:fld id="{AC2D5F89-5D9A-AC47-B53A-AD027F6E2895}" type="datetimeFigureOut">
               <a:rPr lang="de-DE" smtClean="0"/>
-              <a:t>29.04.20</a:t>
+              <a:t>09.11.20</a:t>
             </a:fld>
             <a:endParaRPr lang="de-DE"/>
           </a:p>
@@ -2927,7 +3373,7 @@
           <a:p>
             <a:fld id="{AC2D5F89-5D9A-AC47-B53A-AD027F6E2895}" type="datetimeFigureOut">
               <a:rPr lang="de-DE" smtClean="0"/>
-              <a:t>29.04.20</a:t>
+              <a:t>09.11.20</a:t>
             </a:fld>
             <a:endParaRPr lang="de-DE"/>
           </a:p>
@@ -3488,7 +3934,7 @@
             <a:pPr algn="ctr"/>
             <a:r>
               <a:rPr lang="de-DE" dirty="0" err="1"/>
-              <a:t>dropdown</a:t>
+              <a:t>controls</a:t>
             </a:r>
             <a:endParaRPr lang="de-DE" dirty="0"/>
           </a:p>
@@ -4270,7 +4716,7 @@
         </p:nvSpPr>
         <p:spPr>
           <a:xfrm>
-            <a:off x="5102514" y="2314318"/>
+            <a:off x="5083750" y="2400194"/>
             <a:ext cx="1193222" cy="523220"/>
           </a:xfrm>
           <a:prstGeom prst="rect">
@@ -5016,6 +5462,3282 @@
     <p:extLst>
       <p:ext uri="{BB962C8B-B14F-4D97-AF65-F5344CB8AC3E}">
         <p14:creationId xmlns:p14="http://schemas.microsoft.com/office/powerpoint/2010/main" val="2996955824"/>
+      </p:ext>
+    </p:extLst>
+  </p:cSld>
+  <p:clrMapOvr>
+    <a:masterClrMapping/>
+  </p:clrMapOvr>
+</p:sld>
+</file>
+
+<file path=ppt/slides/slide4.xml><?xml version="1.0" encoding="utf-8"?>
+<p:sld xmlns:a="http://schemas.openxmlformats.org/drawingml/2006/main" xmlns:r="http://schemas.openxmlformats.org/officeDocument/2006/relationships" xmlns:p="http://schemas.openxmlformats.org/presentationml/2006/main">
+  <p:cSld>
+    <p:spTree>
+      <p:nvGrpSpPr>
+        <p:cNvPr id="1" name=""/>
+        <p:cNvGrpSpPr/>
+        <p:nvPr/>
+      </p:nvGrpSpPr>
+      <p:grpSpPr>
+        <a:xfrm>
+          <a:off x="0" y="0"/>
+          <a:ext cx="0" cy="0"/>
+          <a:chOff x="0" y="0"/>
+          <a:chExt cx="0" cy="0"/>
+        </a:xfrm>
+      </p:grpSpPr>
+      <p:sp>
+        <p:nvSpPr>
+          <p:cNvPr id="4" name="Rounded Rectangle 3">
+            <a:extLst>
+              <a:ext uri="{FF2B5EF4-FFF2-40B4-BE49-F238E27FC236}">
+                <a16:creationId xmlns:a16="http://schemas.microsoft.com/office/drawing/2014/main" id="{BC5D1FA5-8C21-F04B-8298-A1AC76AEB7CC}"/>
+              </a:ext>
+            </a:extLst>
+          </p:cNvPr>
+          <p:cNvSpPr/>
+          <p:nvPr/>
+        </p:nvSpPr>
+        <p:spPr>
+          <a:xfrm>
+            <a:off x="2401455" y="1708727"/>
+            <a:ext cx="1311563" cy="554182"/>
+          </a:xfrm>
+          <a:prstGeom prst="roundRect">
+            <a:avLst/>
+          </a:prstGeom>
+        </p:spPr>
+        <p:style>
+          <a:lnRef idx="2">
+            <a:schemeClr val="accent2">
+              <a:shade val="50000"/>
+            </a:schemeClr>
+          </a:lnRef>
+          <a:fillRef idx="1">
+            <a:schemeClr val="accent2"/>
+          </a:fillRef>
+          <a:effectRef idx="0">
+            <a:schemeClr val="accent2"/>
+          </a:effectRef>
+          <a:fontRef idx="minor">
+            <a:schemeClr val="lt1"/>
+          </a:fontRef>
+        </p:style>
+        <p:txBody>
+          <a:bodyPr rtlCol="0" anchor="ctr"/>
+          <a:lstStyle/>
+          <a:p>
+            <a:pPr algn="ctr"/>
+            <a:r>
+              <a:rPr lang="de-DE" dirty="0" err="1"/>
+              <a:t>tab</a:t>
+            </a:r>
+            <a:endParaRPr lang="de-DE" dirty="0"/>
+          </a:p>
+        </p:txBody>
+      </p:sp>
+      <p:sp>
+        <p:nvSpPr>
+          <p:cNvPr id="5" name="Rounded Rectangle 4">
+            <a:extLst>
+              <a:ext uri="{FF2B5EF4-FFF2-40B4-BE49-F238E27FC236}">
+                <a16:creationId xmlns:a16="http://schemas.microsoft.com/office/drawing/2014/main" id="{34101E9D-3D8A-0F4B-AEAC-3BAE04AFC9D9}"/>
+              </a:ext>
+            </a:extLst>
+          </p:cNvPr>
+          <p:cNvSpPr/>
+          <p:nvPr/>
+        </p:nvSpPr>
+        <p:spPr>
+          <a:xfrm>
+            <a:off x="4124126" y="1786718"/>
+            <a:ext cx="1311563" cy="554182"/>
+          </a:xfrm>
+          <a:prstGeom prst="roundRect">
+            <a:avLst/>
+          </a:prstGeom>
+        </p:spPr>
+        <p:style>
+          <a:lnRef idx="2">
+            <a:schemeClr val="accent5">
+              <a:shade val="50000"/>
+            </a:schemeClr>
+          </a:lnRef>
+          <a:fillRef idx="1">
+            <a:schemeClr val="accent5"/>
+          </a:fillRef>
+          <a:effectRef idx="0">
+            <a:schemeClr val="accent5"/>
+          </a:effectRef>
+          <a:fontRef idx="minor">
+            <a:schemeClr val="lt1"/>
+          </a:fontRef>
+        </p:style>
+        <p:txBody>
+          <a:bodyPr rtlCol="0" anchor="ctr"/>
+          <a:lstStyle/>
+          <a:p>
+            <a:pPr algn="ctr"/>
+            <a:r>
+              <a:rPr lang="de-DE" dirty="0" err="1"/>
+              <a:t>map</a:t>
+            </a:r>
+            <a:endParaRPr lang="de-DE" dirty="0"/>
+          </a:p>
+        </p:txBody>
+      </p:sp>
+      <p:sp>
+        <p:nvSpPr>
+          <p:cNvPr id="6" name="Rounded Rectangle 5">
+            <a:extLst>
+              <a:ext uri="{FF2B5EF4-FFF2-40B4-BE49-F238E27FC236}">
+                <a16:creationId xmlns:a16="http://schemas.microsoft.com/office/drawing/2014/main" id="{E9865A80-8001-E141-BC3D-A12F2511D723}"/>
+              </a:ext>
+            </a:extLst>
+          </p:cNvPr>
+          <p:cNvSpPr/>
+          <p:nvPr/>
+        </p:nvSpPr>
+        <p:spPr>
+          <a:xfrm>
+            <a:off x="5190835" y="207818"/>
+            <a:ext cx="1311563" cy="554182"/>
+          </a:xfrm>
+          <a:prstGeom prst="roundRect">
+            <a:avLst/>
+          </a:prstGeom>
+        </p:spPr>
+        <p:style>
+          <a:lnRef idx="2">
+            <a:schemeClr val="accent2">
+              <a:shade val="50000"/>
+            </a:schemeClr>
+          </a:lnRef>
+          <a:fillRef idx="1">
+            <a:schemeClr val="accent2"/>
+          </a:fillRef>
+          <a:effectRef idx="0">
+            <a:schemeClr val="accent2"/>
+          </a:effectRef>
+          <a:fontRef idx="minor">
+            <a:schemeClr val="lt1"/>
+          </a:fontRef>
+        </p:style>
+        <p:txBody>
+          <a:bodyPr rtlCol="0" anchor="ctr"/>
+          <a:lstStyle/>
+          <a:p>
+            <a:pPr algn="ctr"/>
+            <a:r>
+              <a:rPr lang="de-DE" dirty="0" err="1"/>
+              <a:t>controls</a:t>
+            </a:r>
+            <a:endParaRPr lang="de-DE" dirty="0"/>
+          </a:p>
+        </p:txBody>
+      </p:sp>
+      <p:sp>
+        <p:nvSpPr>
+          <p:cNvPr id="7" name="Rounded Rectangle 6">
+            <a:extLst>
+              <a:ext uri="{FF2B5EF4-FFF2-40B4-BE49-F238E27FC236}">
+                <a16:creationId xmlns:a16="http://schemas.microsoft.com/office/drawing/2014/main" id="{EC22F9DC-95DA-3E43-AE85-0631D10CAE83}"/>
+              </a:ext>
+            </a:extLst>
+          </p:cNvPr>
+          <p:cNvSpPr/>
+          <p:nvPr/>
+        </p:nvSpPr>
+        <p:spPr>
+          <a:xfrm>
+            <a:off x="8114145" y="1715077"/>
+            <a:ext cx="1311563" cy="554182"/>
+          </a:xfrm>
+          <a:prstGeom prst="roundRect">
+            <a:avLst/>
+          </a:prstGeom>
+        </p:spPr>
+        <p:style>
+          <a:lnRef idx="2">
+            <a:schemeClr val="accent6">
+              <a:shade val="50000"/>
+            </a:schemeClr>
+          </a:lnRef>
+          <a:fillRef idx="1">
+            <a:schemeClr val="accent6"/>
+          </a:fillRef>
+          <a:effectRef idx="0">
+            <a:schemeClr val="accent6"/>
+          </a:effectRef>
+          <a:fontRef idx="minor">
+            <a:schemeClr val="lt1"/>
+          </a:fontRef>
+        </p:style>
+        <p:txBody>
+          <a:bodyPr rtlCol="0" anchor="ctr"/>
+          <a:lstStyle/>
+          <a:p>
+            <a:pPr algn="ctr"/>
+            <a:r>
+              <a:rPr lang="de-DE" dirty="0"/>
+              <a:t>sub-title</a:t>
+            </a:r>
+          </a:p>
+        </p:txBody>
+      </p:sp>
+      <p:sp>
+        <p:nvSpPr>
+          <p:cNvPr id="8" name="Rounded Rectangle 7">
+            <a:extLst>
+              <a:ext uri="{FF2B5EF4-FFF2-40B4-BE49-F238E27FC236}">
+                <a16:creationId xmlns:a16="http://schemas.microsoft.com/office/drawing/2014/main" id="{37AD2575-01C8-B942-8BE7-83A9420A84BC}"/>
+              </a:ext>
+            </a:extLst>
+          </p:cNvPr>
+          <p:cNvSpPr/>
+          <p:nvPr/>
+        </p:nvSpPr>
+        <p:spPr>
+          <a:xfrm>
+            <a:off x="5449456" y="3266541"/>
+            <a:ext cx="1311563" cy="554182"/>
+          </a:xfrm>
+          <a:prstGeom prst="roundRect">
+            <a:avLst/>
+          </a:prstGeom>
+        </p:spPr>
+        <p:style>
+          <a:lnRef idx="2">
+            <a:schemeClr val="accent3">
+              <a:shade val="50000"/>
+            </a:schemeClr>
+          </a:lnRef>
+          <a:fillRef idx="1">
+            <a:schemeClr val="accent3"/>
+          </a:fillRef>
+          <a:effectRef idx="0">
+            <a:schemeClr val="accent3"/>
+          </a:effectRef>
+          <a:fontRef idx="minor">
+            <a:schemeClr val="lt1"/>
+          </a:fontRef>
+        </p:style>
+        <p:txBody>
+          <a:bodyPr rtlCol="0" anchor="ctr"/>
+          <a:lstStyle/>
+          <a:p>
+            <a:pPr algn="ctr"/>
+            <a:r>
+              <a:rPr lang="de-DE" dirty="0" err="1"/>
+              <a:t>regions</a:t>
+            </a:r>
+            <a:endParaRPr lang="de-DE" dirty="0"/>
+          </a:p>
+        </p:txBody>
+      </p:sp>
+      <p:sp>
+        <p:nvSpPr>
+          <p:cNvPr id="9" name="Rounded Rectangle 8">
+            <a:extLst>
+              <a:ext uri="{FF2B5EF4-FFF2-40B4-BE49-F238E27FC236}">
+                <a16:creationId xmlns:a16="http://schemas.microsoft.com/office/drawing/2014/main" id="{EDFE27F5-E157-DC41-AA0E-F105BBD01725}"/>
+              </a:ext>
+            </a:extLst>
+          </p:cNvPr>
+          <p:cNvSpPr/>
+          <p:nvPr/>
+        </p:nvSpPr>
+        <p:spPr>
+          <a:xfrm>
+            <a:off x="6049818" y="1708727"/>
+            <a:ext cx="1311563" cy="554182"/>
+          </a:xfrm>
+          <a:prstGeom prst="roundRect">
+            <a:avLst/>
+          </a:prstGeom>
+        </p:spPr>
+        <p:style>
+          <a:lnRef idx="2">
+            <a:schemeClr val="accent6">
+              <a:shade val="50000"/>
+            </a:schemeClr>
+          </a:lnRef>
+          <a:fillRef idx="1">
+            <a:schemeClr val="accent6"/>
+          </a:fillRef>
+          <a:effectRef idx="0">
+            <a:schemeClr val="accent6"/>
+          </a:effectRef>
+          <a:fontRef idx="minor">
+            <a:schemeClr val="lt1"/>
+          </a:fontRef>
+        </p:style>
+        <p:txBody>
+          <a:bodyPr rtlCol="0" anchor="ctr"/>
+          <a:lstStyle/>
+          <a:p>
+            <a:pPr algn="ctr"/>
+            <a:r>
+              <a:rPr lang="de-DE" dirty="0" err="1"/>
+              <a:t>series</a:t>
+            </a:r>
+            <a:endParaRPr lang="de-DE" dirty="0"/>
+          </a:p>
+        </p:txBody>
+      </p:sp>
+      <p:cxnSp>
+        <p:nvCxnSpPr>
+          <p:cNvPr id="11" name="Curved Connector 10">
+            <a:extLst>
+              <a:ext uri="{FF2B5EF4-FFF2-40B4-BE49-F238E27FC236}">
+                <a16:creationId xmlns:a16="http://schemas.microsoft.com/office/drawing/2014/main" id="{E4BCF484-D405-6644-AB99-F8DD8C8934BE}"/>
+              </a:ext>
+            </a:extLst>
+          </p:cNvPr>
+          <p:cNvCxnSpPr>
+            <a:cxnSpLocks/>
+            <a:stCxn id="5" idx="2"/>
+            <a:endCxn id="4" idx="2"/>
+          </p:cNvCxnSpPr>
+          <p:nvPr/>
+        </p:nvCxnSpPr>
+        <p:spPr>
+          <a:xfrm rot="5400000" flipH="1">
+            <a:off x="3879577" y="1440570"/>
+            <a:ext cx="77991" cy="1722671"/>
+          </a:xfrm>
+          <a:prstGeom prst="curvedConnector3">
+            <a:avLst>
+              <a:gd name="adj1" fmla="val -293111"/>
+            </a:avLst>
+          </a:prstGeom>
+          <a:ln>
+            <a:tailEnd type="triangle"/>
+          </a:ln>
+        </p:spPr>
+        <p:style>
+          <a:lnRef idx="1">
+            <a:schemeClr val="accent1"/>
+          </a:lnRef>
+          <a:fillRef idx="0">
+            <a:schemeClr val="accent1"/>
+          </a:fillRef>
+          <a:effectRef idx="0">
+            <a:schemeClr val="accent1"/>
+          </a:effectRef>
+          <a:fontRef idx="minor">
+            <a:schemeClr val="tx1"/>
+          </a:fontRef>
+        </p:style>
+      </p:cxnSp>
+      <p:cxnSp>
+        <p:nvCxnSpPr>
+          <p:cNvPr id="13" name="Curved Connector 12">
+            <a:extLst>
+              <a:ext uri="{FF2B5EF4-FFF2-40B4-BE49-F238E27FC236}">
+                <a16:creationId xmlns:a16="http://schemas.microsoft.com/office/drawing/2014/main" id="{1C7DF1ED-0107-8242-B2F6-B5B08E10F377}"/>
+              </a:ext>
+            </a:extLst>
+          </p:cNvPr>
+          <p:cNvCxnSpPr>
+            <a:cxnSpLocks/>
+            <a:stCxn id="8" idx="0"/>
+            <a:endCxn id="9" idx="2"/>
+          </p:cNvCxnSpPr>
+          <p:nvPr/>
+        </p:nvCxnSpPr>
+        <p:spPr>
+          <a:xfrm rot="5400000" flipH="1" flipV="1">
+            <a:off x="5903603" y="2464544"/>
+            <a:ext cx="1003632" cy="600362"/>
+          </a:xfrm>
+          <a:prstGeom prst="curvedConnector3">
+            <a:avLst>
+              <a:gd name="adj1" fmla="val 50000"/>
+            </a:avLst>
+          </a:prstGeom>
+          <a:ln>
+            <a:tailEnd type="triangle"/>
+          </a:ln>
+        </p:spPr>
+        <p:style>
+          <a:lnRef idx="1">
+            <a:schemeClr val="accent1"/>
+          </a:lnRef>
+          <a:fillRef idx="0">
+            <a:schemeClr val="accent1"/>
+          </a:fillRef>
+          <a:effectRef idx="0">
+            <a:schemeClr val="accent1"/>
+          </a:effectRef>
+          <a:fontRef idx="minor">
+            <a:schemeClr val="tx1"/>
+          </a:fontRef>
+        </p:style>
+      </p:cxnSp>
+      <p:cxnSp>
+        <p:nvCxnSpPr>
+          <p:cNvPr id="16" name="Curved Connector 15">
+            <a:extLst>
+              <a:ext uri="{FF2B5EF4-FFF2-40B4-BE49-F238E27FC236}">
+                <a16:creationId xmlns:a16="http://schemas.microsoft.com/office/drawing/2014/main" id="{3C6479C1-D2E3-D74E-BD69-ECC3B38DC071}"/>
+              </a:ext>
+            </a:extLst>
+          </p:cNvPr>
+          <p:cNvCxnSpPr>
+            <a:cxnSpLocks/>
+            <a:stCxn id="6" idx="2"/>
+            <a:endCxn id="5" idx="0"/>
+          </p:cNvCxnSpPr>
+          <p:nvPr/>
+        </p:nvCxnSpPr>
+        <p:spPr>
+          <a:xfrm rot="5400000">
+            <a:off x="4800904" y="741005"/>
+            <a:ext cx="1024718" cy="1066709"/>
+          </a:xfrm>
+          <a:prstGeom prst="curvedConnector3">
+            <a:avLst>
+              <a:gd name="adj1" fmla="val 50000"/>
+            </a:avLst>
+          </a:prstGeom>
+          <a:ln>
+            <a:tailEnd type="triangle"/>
+          </a:ln>
+        </p:spPr>
+        <p:style>
+          <a:lnRef idx="1">
+            <a:schemeClr val="accent1"/>
+          </a:lnRef>
+          <a:fillRef idx="0">
+            <a:schemeClr val="accent1"/>
+          </a:fillRef>
+          <a:effectRef idx="0">
+            <a:schemeClr val="accent1"/>
+          </a:effectRef>
+          <a:fontRef idx="minor">
+            <a:schemeClr val="tx1"/>
+          </a:fontRef>
+        </p:style>
+      </p:cxnSp>
+      <p:cxnSp>
+        <p:nvCxnSpPr>
+          <p:cNvPr id="19" name="Curved Connector 18">
+            <a:extLst>
+              <a:ext uri="{FF2B5EF4-FFF2-40B4-BE49-F238E27FC236}">
+                <a16:creationId xmlns:a16="http://schemas.microsoft.com/office/drawing/2014/main" id="{EB6C91D1-56D2-0746-A852-23B7CF93149E}"/>
+              </a:ext>
+            </a:extLst>
+          </p:cNvPr>
+          <p:cNvCxnSpPr>
+            <a:cxnSpLocks/>
+            <a:stCxn id="6" idx="2"/>
+            <a:endCxn id="9" idx="0"/>
+          </p:cNvCxnSpPr>
+          <p:nvPr/>
+        </p:nvCxnSpPr>
+        <p:spPr>
+          <a:xfrm rot="16200000" flipH="1">
+            <a:off x="5802745" y="805871"/>
+            <a:ext cx="946727" cy="858983"/>
+          </a:xfrm>
+          <a:prstGeom prst="curvedConnector3">
+            <a:avLst>
+              <a:gd name="adj1" fmla="val 50000"/>
+            </a:avLst>
+          </a:prstGeom>
+          <a:ln>
+            <a:tailEnd type="triangle"/>
+          </a:ln>
+        </p:spPr>
+        <p:style>
+          <a:lnRef idx="1">
+            <a:schemeClr val="accent1"/>
+          </a:lnRef>
+          <a:fillRef idx="0">
+            <a:schemeClr val="accent1"/>
+          </a:fillRef>
+          <a:effectRef idx="0">
+            <a:schemeClr val="accent1"/>
+          </a:effectRef>
+          <a:fontRef idx="minor">
+            <a:schemeClr val="tx1"/>
+          </a:fontRef>
+        </p:style>
+      </p:cxnSp>
+      <p:cxnSp>
+        <p:nvCxnSpPr>
+          <p:cNvPr id="24" name="Curved Connector 23">
+            <a:extLst>
+              <a:ext uri="{FF2B5EF4-FFF2-40B4-BE49-F238E27FC236}">
+                <a16:creationId xmlns:a16="http://schemas.microsoft.com/office/drawing/2014/main" id="{59F7B6A5-E2E8-5845-9298-28FC17E91006}"/>
+              </a:ext>
+            </a:extLst>
+          </p:cNvPr>
+          <p:cNvCxnSpPr>
+            <a:cxnSpLocks/>
+            <a:stCxn id="4" idx="2"/>
+            <a:endCxn id="8" idx="1"/>
+          </p:cNvCxnSpPr>
+          <p:nvPr/>
+        </p:nvCxnSpPr>
+        <p:spPr>
+          <a:xfrm rot="16200000" flipH="1">
+            <a:off x="3612985" y="1707160"/>
+            <a:ext cx="1280723" cy="2392219"/>
+          </a:xfrm>
+          <a:prstGeom prst="curvedConnector2">
+            <a:avLst/>
+          </a:prstGeom>
+          <a:ln>
+            <a:tailEnd type="triangle"/>
+          </a:ln>
+        </p:spPr>
+        <p:style>
+          <a:lnRef idx="1">
+            <a:schemeClr val="accent1"/>
+          </a:lnRef>
+          <a:fillRef idx="0">
+            <a:schemeClr val="accent1"/>
+          </a:fillRef>
+          <a:effectRef idx="0">
+            <a:schemeClr val="accent1"/>
+          </a:effectRef>
+          <a:fontRef idx="minor">
+            <a:schemeClr val="tx1"/>
+          </a:fontRef>
+        </p:style>
+      </p:cxnSp>
+      <p:cxnSp>
+        <p:nvCxnSpPr>
+          <p:cNvPr id="27" name="Curved Connector 26">
+            <a:extLst>
+              <a:ext uri="{FF2B5EF4-FFF2-40B4-BE49-F238E27FC236}">
+                <a16:creationId xmlns:a16="http://schemas.microsoft.com/office/drawing/2014/main" id="{D10D26A7-D932-744C-B3E5-0FC3D7CB312E}"/>
+              </a:ext>
+            </a:extLst>
+          </p:cNvPr>
+          <p:cNvCxnSpPr>
+            <a:cxnSpLocks/>
+            <a:stCxn id="5" idx="2"/>
+            <a:endCxn id="8" idx="1"/>
+          </p:cNvCxnSpPr>
+          <p:nvPr/>
+        </p:nvCxnSpPr>
+        <p:spPr>
+          <a:xfrm rot="16200000" flipH="1">
+            <a:off x="4513316" y="2607492"/>
+            <a:ext cx="1202732" cy="669548"/>
+          </a:xfrm>
+          <a:prstGeom prst="curvedConnector2">
+            <a:avLst/>
+          </a:prstGeom>
+          <a:ln>
+            <a:tailEnd type="triangle"/>
+          </a:ln>
+        </p:spPr>
+        <p:style>
+          <a:lnRef idx="1">
+            <a:schemeClr val="accent1"/>
+          </a:lnRef>
+          <a:fillRef idx="0">
+            <a:schemeClr val="accent1"/>
+          </a:fillRef>
+          <a:effectRef idx="0">
+            <a:schemeClr val="accent1"/>
+          </a:effectRef>
+          <a:fontRef idx="minor">
+            <a:schemeClr val="tx1"/>
+          </a:fontRef>
+        </p:style>
+      </p:cxnSp>
+      <p:cxnSp>
+        <p:nvCxnSpPr>
+          <p:cNvPr id="30" name="Curved Connector 29">
+            <a:extLst>
+              <a:ext uri="{FF2B5EF4-FFF2-40B4-BE49-F238E27FC236}">
+                <a16:creationId xmlns:a16="http://schemas.microsoft.com/office/drawing/2014/main" id="{5C7260D2-BFCF-9544-BACF-2E6BD58E6EC2}"/>
+              </a:ext>
+            </a:extLst>
+          </p:cNvPr>
+          <p:cNvCxnSpPr>
+            <a:cxnSpLocks/>
+            <a:stCxn id="6" idx="2"/>
+            <a:endCxn id="7" idx="0"/>
+          </p:cNvCxnSpPr>
+          <p:nvPr/>
+        </p:nvCxnSpPr>
+        <p:spPr>
+          <a:xfrm rot="16200000" flipH="1">
+            <a:off x="6831734" y="-223117"/>
+            <a:ext cx="953077" cy="2923310"/>
+          </a:xfrm>
+          <a:prstGeom prst="curvedConnector3">
+            <a:avLst>
+              <a:gd name="adj1" fmla="val 50000"/>
+            </a:avLst>
+          </a:prstGeom>
+          <a:ln>
+            <a:tailEnd type="triangle"/>
+          </a:ln>
+        </p:spPr>
+        <p:style>
+          <a:lnRef idx="1">
+            <a:schemeClr val="accent1"/>
+          </a:lnRef>
+          <a:fillRef idx="0">
+            <a:schemeClr val="accent1"/>
+          </a:fillRef>
+          <a:effectRef idx="0">
+            <a:schemeClr val="accent1"/>
+          </a:effectRef>
+          <a:fontRef idx="minor">
+            <a:schemeClr val="tx1"/>
+          </a:fontRef>
+        </p:style>
+      </p:cxnSp>
+      <p:cxnSp>
+        <p:nvCxnSpPr>
+          <p:cNvPr id="38" name="Curved Connector 37">
+            <a:extLst>
+              <a:ext uri="{FF2B5EF4-FFF2-40B4-BE49-F238E27FC236}">
+                <a16:creationId xmlns:a16="http://schemas.microsoft.com/office/drawing/2014/main" id="{2E0001BD-632F-D349-B83B-EB2A29D494DA}"/>
+              </a:ext>
+            </a:extLst>
+          </p:cNvPr>
+          <p:cNvCxnSpPr>
+            <a:cxnSpLocks/>
+            <a:stCxn id="8" idx="3"/>
+            <a:endCxn id="7" idx="2"/>
+          </p:cNvCxnSpPr>
+          <p:nvPr/>
+        </p:nvCxnSpPr>
+        <p:spPr>
+          <a:xfrm flipV="1">
+            <a:off x="6761019" y="2269259"/>
+            <a:ext cx="2008908" cy="1274373"/>
+          </a:xfrm>
+          <a:prstGeom prst="curvedConnector2">
+            <a:avLst/>
+          </a:prstGeom>
+          <a:ln>
+            <a:tailEnd type="triangle"/>
+          </a:ln>
+        </p:spPr>
+        <p:style>
+          <a:lnRef idx="1">
+            <a:schemeClr val="accent1"/>
+          </a:lnRef>
+          <a:fillRef idx="0">
+            <a:schemeClr val="accent1"/>
+          </a:fillRef>
+          <a:effectRef idx="0">
+            <a:schemeClr val="accent1"/>
+          </a:effectRef>
+          <a:fontRef idx="minor">
+            <a:schemeClr val="tx1"/>
+          </a:fontRef>
+        </p:style>
+      </p:cxnSp>
+      <p:sp>
+        <p:nvSpPr>
+          <p:cNvPr id="50" name="TextBox 49">
+            <a:extLst>
+              <a:ext uri="{FF2B5EF4-FFF2-40B4-BE49-F238E27FC236}">
+                <a16:creationId xmlns:a16="http://schemas.microsoft.com/office/drawing/2014/main" id="{256F9057-4E24-7648-A9AD-24D43113BE41}"/>
+              </a:ext>
+            </a:extLst>
+          </p:cNvPr>
+          <p:cNvSpPr txBox="1"/>
+          <p:nvPr/>
+        </p:nvSpPr>
+        <p:spPr>
+          <a:xfrm>
+            <a:off x="3562351" y="2226115"/>
+            <a:ext cx="872836" cy="307777"/>
+          </a:xfrm>
+          <a:prstGeom prst="rect">
+            <a:avLst/>
+          </a:prstGeom>
+          <a:noFill/>
+        </p:spPr>
+        <p:txBody>
+          <a:bodyPr wrap="square" rtlCol="0">
+            <a:spAutoFit/>
+          </a:bodyPr>
+          <a:lstStyle/>
+          <a:p>
+            <a:pPr algn="ctr"/>
+            <a:r>
+              <a:rPr lang="de-DE" sz="1400" dirty="0" err="1"/>
+              <a:t>reset</a:t>
+            </a:r>
+            <a:endParaRPr lang="de-DE" sz="1400" dirty="0"/>
+          </a:p>
+        </p:txBody>
+      </p:sp>
+      <p:sp>
+        <p:nvSpPr>
+          <p:cNvPr id="52" name="TextBox 51">
+            <a:extLst>
+              <a:ext uri="{FF2B5EF4-FFF2-40B4-BE49-F238E27FC236}">
+                <a16:creationId xmlns:a16="http://schemas.microsoft.com/office/drawing/2014/main" id="{91B3B0C5-7935-6B46-85AE-62455D9F4DDB}"/>
+              </a:ext>
+            </a:extLst>
+          </p:cNvPr>
+          <p:cNvSpPr txBox="1"/>
+          <p:nvPr/>
+        </p:nvSpPr>
+        <p:spPr>
+          <a:xfrm>
+            <a:off x="4248734" y="2702306"/>
+            <a:ext cx="872836" cy="307777"/>
+          </a:xfrm>
+          <a:prstGeom prst="rect">
+            <a:avLst/>
+          </a:prstGeom>
+          <a:noFill/>
+        </p:spPr>
+        <p:txBody>
+          <a:bodyPr wrap="square" rtlCol="0">
+            <a:spAutoFit/>
+          </a:bodyPr>
+          <a:lstStyle/>
+          <a:p>
+            <a:pPr algn="ctr"/>
+            <a:r>
+              <a:rPr lang="de-DE" sz="1400" dirty="0" err="1"/>
+              <a:t>country</a:t>
+            </a:r>
+            <a:endParaRPr lang="de-DE" sz="1400" dirty="0"/>
+          </a:p>
+        </p:txBody>
+      </p:sp>
+      <p:sp>
+        <p:nvSpPr>
+          <p:cNvPr id="53" name="TextBox 52">
+            <a:extLst>
+              <a:ext uri="{FF2B5EF4-FFF2-40B4-BE49-F238E27FC236}">
+                <a16:creationId xmlns:a16="http://schemas.microsoft.com/office/drawing/2014/main" id="{778991E6-F2DC-3C41-A9A2-022F5EB73272}"/>
+              </a:ext>
+            </a:extLst>
+          </p:cNvPr>
+          <p:cNvSpPr txBox="1"/>
+          <p:nvPr/>
+        </p:nvSpPr>
+        <p:spPr>
+          <a:xfrm>
+            <a:off x="3089566" y="3131123"/>
+            <a:ext cx="969819" cy="307777"/>
+          </a:xfrm>
+          <a:prstGeom prst="rect">
+            <a:avLst/>
+          </a:prstGeom>
+          <a:noFill/>
+        </p:spPr>
+        <p:txBody>
+          <a:bodyPr wrap="square" rtlCol="0">
+            <a:spAutoFit/>
+          </a:bodyPr>
+          <a:lstStyle/>
+          <a:p>
+            <a:pPr algn="ctr"/>
+            <a:r>
+              <a:rPr lang="de-DE" sz="1400" dirty="0" err="1"/>
+              <a:t>continent</a:t>
+            </a:r>
+            <a:endParaRPr lang="de-DE" sz="1400" dirty="0"/>
+          </a:p>
+        </p:txBody>
+      </p:sp>
+      <p:sp>
+        <p:nvSpPr>
+          <p:cNvPr id="54" name="TextBox 53">
+            <a:extLst>
+              <a:ext uri="{FF2B5EF4-FFF2-40B4-BE49-F238E27FC236}">
+                <a16:creationId xmlns:a16="http://schemas.microsoft.com/office/drawing/2014/main" id="{58A7433F-AD2A-BD4C-8B65-B4532AF03F6E}"/>
+              </a:ext>
+            </a:extLst>
+          </p:cNvPr>
+          <p:cNvSpPr txBox="1"/>
+          <p:nvPr/>
+        </p:nvSpPr>
+        <p:spPr>
+          <a:xfrm>
+            <a:off x="6204530" y="2706008"/>
+            <a:ext cx="872836" cy="307777"/>
+          </a:xfrm>
+          <a:prstGeom prst="rect">
+            <a:avLst/>
+          </a:prstGeom>
+          <a:noFill/>
+        </p:spPr>
+        <p:txBody>
+          <a:bodyPr wrap="square" rtlCol="0">
+            <a:spAutoFit/>
+          </a:bodyPr>
+          <a:lstStyle/>
+          <a:p>
+            <a:pPr algn="ctr"/>
+            <a:r>
+              <a:rPr lang="de-DE" sz="1400" dirty="0" err="1"/>
+              <a:t>regions</a:t>
+            </a:r>
+            <a:endParaRPr lang="de-DE" sz="1400" dirty="0"/>
+          </a:p>
+        </p:txBody>
+      </p:sp>
+      <p:sp>
+        <p:nvSpPr>
+          <p:cNvPr id="55" name="TextBox 54">
+            <a:extLst>
+              <a:ext uri="{FF2B5EF4-FFF2-40B4-BE49-F238E27FC236}">
+                <a16:creationId xmlns:a16="http://schemas.microsoft.com/office/drawing/2014/main" id="{0CB0CD42-E476-FC49-AEE1-86C6228A20F1}"/>
+              </a:ext>
+            </a:extLst>
+          </p:cNvPr>
+          <p:cNvSpPr txBox="1"/>
+          <p:nvPr/>
+        </p:nvSpPr>
+        <p:spPr>
+          <a:xfrm>
+            <a:off x="8061040" y="3010083"/>
+            <a:ext cx="872836" cy="307777"/>
+          </a:xfrm>
+          <a:prstGeom prst="rect">
+            <a:avLst/>
+          </a:prstGeom>
+          <a:noFill/>
+        </p:spPr>
+        <p:txBody>
+          <a:bodyPr wrap="square" rtlCol="0">
+            <a:spAutoFit/>
+          </a:bodyPr>
+          <a:lstStyle/>
+          <a:p>
+            <a:pPr algn="ctr"/>
+            <a:r>
+              <a:rPr lang="de-DE" sz="1400" dirty="0" err="1"/>
+              <a:t>regions</a:t>
+            </a:r>
+            <a:endParaRPr lang="de-DE" sz="1400" dirty="0"/>
+          </a:p>
+        </p:txBody>
+      </p:sp>
+      <p:sp>
+        <p:nvSpPr>
+          <p:cNvPr id="56" name="TextBox 55">
+            <a:extLst>
+              <a:ext uri="{FF2B5EF4-FFF2-40B4-BE49-F238E27FC236}">
+                <a16:creationId xmlns:a16="http://schemas.microsoft.com/office/drawing/2014/main" id="{67492580-84E8-D243-A818-068E71DFD2F2}"/>
+              </a:ext>
+            </a:extLst>
+          </p:cNvPr>
+          <p:cNvSpPr txBox="1"/>
+          <p:nvPr/>
+        </p:nvSpPr>
+        <p:spPr>
+          <a:xfrm>
+            <a:off x="6832599" y="927585"/>
+            <a:ext cx="872836" cy="307777"/>
+          </a:xfrm>
+          <a:prstGeom prst="rect">
+            <a:avLst/>
+          </a:prstGeom>
+          <a:noFill/>
+        </p:spPr>
+        <p:txBody>
+          <a:bodyPr wrap="square" rtlCol="0">
+            <a:spAutoFit/>
+          </a:bodyPr>
+          <a:lstStyle/>
+          <a:p>
+            <a:pPr algn="ctr"/>
+            <a:r>
+              <a:rPr lang="de-DE" sz="1400" dirty="0" err="1"/>
+              <a:t>indicator</a:t>
+            </a:r>
+            <a:endParaRPr lang="de-DE" sz="1400" dirty="0"/>
+          </a:p>
+        </p:txBody>
+      </p:sp>
+      <p:sp>
+        <p:nvSpPr>
+          <p:cNvPr id="57" name="TextBox 56">
+            <a:extLst>
+              <a:ext uri="{FF2B5EF4-FFF2-40B4-BE49-F238E27FC236}">
+                <a16:creationId xmlns:a16="http://schemas.microsoft.com/office/drawing/2014/main" id="{894C4E13-4226-994D-A0EA-7C1B75930E78}"/>
+              </a:ext>
+            </a:extLst>
+          </p:cNvPr>
+          <p:cNvSpPr txBox="1"/>
+          <p:nvPr/>
+        </p:nvSpPr>
+        <p:spPr>
+          <a:xfrm>
+            <a:off x="4519536" y="996496"/>
+            <a:ext cx="872836" cy="307777"/>
+          </a:xfrm>
+          <a:prstGeom prst="rect">
+            <a:avLst/>
+          </a:prstGeom>
+          <a:noFill/>
+        </p:spPr>
+        <p:txBody>
+          <a:bodyPr wrap="square" rtlCol="0">
+            <a:spAutoFit/>
+          </a:bodyPr>
+          <a:lstStyle/>
+          <a:p>
+            <a:pPr algn="ctr"/>
+            <a:r>
+              <a:rPr lang="de-DE" sz="1400" dirty="0" err="1"/>
+              <a:t>indicator</a:t>
+            </a:r>
+            <a:endParaRPr lang="de-DE" sz="1400" dirty="0"/>
+          </a:p>
+        </p:txBody>
+      </p:sp>
+      <p:sp>
+        <p:nvSpPr>
+          <p:cNvPr id="58" name="TextBox 57">
+            <a:extLst>
+              <a:ext uri="{FF2B5EF4-FFF2-40B4-BE49-F238E27FC236}">
+                <a16:creationId xmlns:a16="http://schemas.microsoft.com/office/drawing/2014/main" id="{64CB39F6-FA30-BA4F-A9B9-910C0AD8BD5F}"/>
+              </a:ext>
+            </a:extLst>
+          </p:cNvPr>
+          <p:cNvSpPr txBox="1"/>
+          <p:nvPr/>
+        </p:nvSpPr>
+        <p:spPr>
+          <a:xfrm>
+            <a:off x="5083750" y="2400194"/>
+            <a:ext cx="1193222" cy="523220"/>
+          </a:xfrm>
+          <a:prstGeom prst="rect">
+            <a:avLst/>
+          </a:prstGeom>
+          <a:noFill/>
+        </p:spPr>
+        <p:txBody>
+          <a:bodyPr wrap="square" rtlCol="0">
+            <a:spAutoFit/>
+          </a:bodyPr>
+          <a:lstStyle/>
+          <a:p>
+            <a:pPr algn="ctr"/>
+            <a:r>
+              <a:rPr lang="de-DE" sz="1400" dirty="0" err="1"/>
+              <a:t>bbox</a:t>
+            </a:r>
+            <a:endParaRPr lang="de-DE" sz="1400" dirty="0"/>
+          </a:p>
+          <a:p>
+            <a:pPr algn="ctr"/>
+            <a:r>
+              <a:rPr lang="de-DE" sz="1400" dirty="0"/>
+              <a:t>(</a:t>
+            </a:r>
+            <a:r>
+              <a:rPr lang="de-DE" sz="1400" dirty="0" err="1"/>
+              <a:t>continent</a:t>
+            </a:r>
+            <a:r>
+              <a:rPr lang="de-DE" sz="1400" dirty="0"/>
+              <a:t>)</a:t>
+            </a:r>
+          </a:p>
+        </p:txBody>
+      </p:sp>
+      <p:cxnSp>
+        <p:nvCxnSpPr>
+          <p:cNvPr id="63" name="Curved Connector 62">
+            <a:extLst>
+              <a:ext uri="{FF2B5EF4-FFF2-40B4-BE49-F238E27FC236}">
+                <a16:creationId xmlns:a16="http://schemas.microsoft.com/office/drawing/2014/main" id="{E87640BD-433B-8142-A210-2B91115F08F4}"/>
+              </a:ext>
+            </a:extLst>
+          </p:cNvPr>
+          <p:cNvCxnSpPr>
+            <a:cxnSpLocks/>
+            <a:stCxn id="8" idx="0"/>
+            <a:endCxn id="5" idx="2"/>
+          </p:cNvCxnSpPr>
+          <p:nvPr/>
+        </p:nvCxnSpPr>
+        <p:spPr>
+          <a:xfrm rot="16200000" flipV="1">
+            <a:off x="4979753" y="2141056"/>
+            <a:ext cx="925641" cy="1325330"/>
+          </a:xfrm>
+          <a:prstGeom prst="curvedConnector3">
+            <a:avLst>
+              <a:gd name="adj1" fmla="val 50000"/>
+            </a:avLst>
+          </a:prstGeom>
+          <a:ln>
+            <a:tailEnd type="triangle"/>
+          </a:ln>
+        </p:spPr>
+        <p:style>
+          <a:lnRef idx="1">
+            <a:schemeClr val="accent1"/>
+          </a:lnRef>
+          <a:fillRef idx="0">
+            <a:schemeClr val="accent1"/>
+          </a:fillRef>
+          <a:effectRef idx="0">
+            <a:schemeClr val="accent1"/>
+          </a:effectRef>
+          <a:fontRef idx="minor">
+            <a:schemeClr val="tx1"/>
+          </a:fontRef>
+        </p:style>
+      </p:cxnSp>
+      <p:sp>
+        <p:nvSpPr>
+          <p:cNvPr id="66" name="Rounded Rectangle 65">
+            <a:extLst>
+              <a:ext uri="{FF2B5EF4-FFF2-40B4-BE49-F238E27FC236}">
+                <a16:creationId xmlns:a16="http://schemas.microsoft.com/office/drawing/2014/main" id="{57FFA6F7-7A22-8A4E-91F5-2B5AD93CA2DB}"/>
+              </a:ext>
+            </a:extLst>
+          </p:cNvPr>
+          <p:cNvSpPr/>
+          <p:nvPr/>
+        </p:nvSpPr>
+        <p:spPr>
+          <a:xfrm>
+            <a:off x="554766" y="1630883"/>
+            <a:ext cx="1323105" cy="412508"/>
+          </a:xfrm>
+          <a:prstGeom prst="roundRect">
+            <a:avLst/>
+          </a:prstGeom>
+        </p:spPr>
+        <p:style>
+          <a:lnRef idx="2">
+            <a:schemeClr val="accent6">
+              <a:shade val="50000"/>
+            </a:schemeClr>
+          </a:lnRef>
+          <a:fillRef idx="1">
+            <a:schemeClr val="accent6"/>
+          </a:fillRef>
+          <a:effectRef idx="0">
+            <a:schemeClr val="accent6"/>
+          </a:effectRef>
+          <a:fontRef idx="minor">
+            <a:schemeClr val="lt1"/>
+          </a:fontRef>
+        </p:style>
+        <p:txBody>
+          <a:bodyPr rtlCol="0" anchor="ctr"/>
+          <a:lstStyle/>
+          <a:p>
+            <a:pPr algn="ctr"/>
+            <a:r>
+              <a:rPr lang="de-DE" dirty="0" err="1"/>
+              <a:t>output</a:t>
+            </a:r>
+            <a:endParaRPr lang="de-DE" dirty="0"/>
+          </a:p>
+        </p:txBody>
+      </p:sp>
+      <p:sp>
+        <p:nvSpPr>
+          <p:cNvPr id="67" name="Rounded Rectangle 66">
+            <a:extLst>
+              <a:ext uri="{FF2B5EF4-FFF2-40B4-BE49-F238E27FC236}">
+                <a16:creationId xmlns:a16="http://schemas.microsoft.com/office/drawing/2014/main" id="{CA3F811C-F5AC-D04A-B27D-5FD79798DF90}"/>
+              </a:ext>
+            </a:extLst>
+          </p:cNvPr>
+          <p:cNvSpPr/>
+          <p:nvPr/>
+        </p:nvSpPr>
+        <p:spPr>
+          <a:xfrm>
+            <a:off x="554766" y="2114229"/>
+            <a:ext cx="1323105" cy="412508"/>
+          </a:xfrm>
+          <a:prstGeom prst="roundRect">
+            <a:avLst/>
+          </a:prstGeom>
+        </p:spPr>
+        <p:style>
+          <a:lnRef idx="3">
+            <a:schemeClr val="lt1"/>
+          </a:lnRef>
+          <a:fillRef idx="1">
+            <a:schemeClr val="accent2"/>
+          </a:fillRef>
+          <a:effectRef idx="1">
+            <a:schemeClr val="accent2"/>
+          </a:effectRef>
+          <a:fontRef idx="minor">
+            <a:schemeClr val="lt1"/>
+          </a:fontRef>
+        </p:style>
+        <p:txBody>
+          <a:bodyPr rtlCol="0" anchor="ctr"/>
+          <a:lstStyle/>
+          <a:p>
+            <a:pPr algn="ctr"/>
+            <a:r>
+              <a:rPr lang="de-DE" dirty="0" err="1"/>
+              <a:t>input</a:t>
+            </a:r>
+            <a:endParaRPr lang="de-DE" dirty="0"/>
+          </a:p>
+        </p:txBody>
+      </p:sp>
+      <p:sp>
+        <p:nvSpPr>
+          <p:cNvPr id="68" name="Rounded Rectangle 67">
+            <a:extLst>
+              <a:ext uri="{FF2B5EF4-FFF2-40B4-BE49-F238E27FC236}">
+                <a16:creationId xmlns:a16="http://schemas.microsoft.com/office/drawing/2014/main" id="{BD1E5C74-7B33-E249-878C-1AD733A73764}"/>
+              </a:ext>
+            </a:extLst>
+          </p:cNvPr>
+          <p:cNvSpPr/>
+          <p:nvPr/>
+        </p:nvSpPr>
+        <p:spPr>
+          <a:xfrm>
+            <a:off x="554766" y="2597575"/>
+            <a:ext cx="1323105" cy="412508"/>
+          </a:xfrm>
+          <a:prstGeom prst="roundRect">
+            <a:avLst/>
+          </a:prstGeom>
+        </p:spPr>
+        <p:style>
+          <a:lnRef idx="2">
+            <a:schemeClr val="accent5">
+              <a:shade val="50000"/>
+            </a:schemeClr>
+          </a:lnRef>
+          <a:fillRef idx="1">
+            <a:schemeClr val="accent5"/>
+          </a:fillRef>
+          <a:effectRef idx="0">
+            <a:schemeClr val="accent5"/>
+          </a:effectRef>
+          <a:fontRef idx="minor">
+            <a:schemeClr val="lt1"/>
+          </a:fontRef>
+        </p:style>
+        <p:txBody>
+          <a:bodyPr rtlCol="0" anchor="ctr"/>
+          <a:lstStyle/>
+          <a:p>
+            <a:pPr algn="ctr"/>
+            <a:r>
+              <a:rPr lang="de-DE" dirty="0"/>
+              <a:t>in/</a:t>
+            </a:r>
+            <a:r>
+              <a:rPr lang="de-DE" dirty="0" err="1"/>
+              <a:t>output</a:t>
+            </a:r>
+            <a:endParaRPr lang="de-DE" dirty="0"/>
+          </a:p>
+        </p:txBody>
+      </p:sp>
+      <p:grpSp>
+        <p:nvGrpSpPr>
+          <p:cNvPr id="73" name="Group 72">
+            <a:extLst>
+              <a:ext uri="{FF2B5EF4-FFF2-40B4-BE49-F238E27FC236}">
+                <a16:creationId xmlns:a16="http://schemas.microsoft.com/office/drawing/2014/main" id="{4C4E8760-EFD4-0848-BFA5-D41DAD8F079A}"/>
+              </a:ext>
+            </a:extLst>
+          </p:cNvPr>
+          <p:cNvGrpSpPr/>
+          <p:nvPr/>
+        </p:nvGrpSpPr>
+        <p:grpSpPr>
+          <a:xfrm>
+            <a:off x="587059" y="3594952"/>
+            <a:ext cx="1290812" cy="307777"/>
+            <a:chOff x="587059" y="3594952"/>
+            <a:chExt cx="1290812" cy="307777"/>
+          </a:xfrm>
+        </p:grpSpPr>
+        <p:sp>
+          <p:nvSpPr>
+            <p:cNvPr id="69" name="TextBox 68">
+              <a:extLst>
+                <a:ext uri="{FF2B5EF4-FFF2-40B4-BE49-F238E27FC236}">
+                  <a16:creationId xmlns:a16="http://schemas.microsoft.com/office/drawing/2014/main" id="{E9198556-23F5-A44F-A74D-67DB08150609}"/>
+                </a:ext>
+              </a:extLst>
+            </p:cNvPr>
+            <p:cNvSpPr txBox="1"/>
+            <p:nvPr/>
+          </p:nvSpPr>
+          <p:spPr>
+            <a:xfrm>
+              <a:off x="645543" y="3594952"/>
+              <a:ext cx="1141550" cy="307777"/>
+            </a:xfrm>
+            <a:prstGeom prst="rect">
+              <a:avLst/>
+            </a:prstGeom>
+            <a:noFill/>
+          </p:spPr>
+          <p:txBody>
+            <a:bodyPr wrap="square" rtlCol="0">
+              <a:spAutoFit/>
+            </a:bodyPr>
+            <a:lstStyle/>
+            <a:p>
+              <a:pPr algn="ctr"/>
+              <a:r>
+                <a:rPr lang="de-DE" sz="1400" dirty="0" err="1"/>
+                <a:t>serverside</a:t>
+              </a:r>
+              <a:endParaRPr lang="de-DE" sz="1400" dirty="0"/>
+            </a:p>
+          </p:txBody>
+        </p:sp>
+        <p:cxnSp>
+          <p:nvCxnSpPr>
+            <p:cNvPr id="71" name="Straight Arrow Connector 70">
+              <a:extLst>
+                <a:ext uri="{FF2B5EF4-FFF2-40B4-BE49-F238E27FC236}">
+                  <a16:creationId xmlns:a16="http://schemas.microsoft.com/office/drawing/2014/main" id="{B9D502D3-0F87-4140-91B5-F07D4AB0F794}"/>
+                </a:ext>
+              </a:extLst>
+            </p:cNvPr>
+            <p:cNvCxnSpPr>
+              <a:cxnSpLocks/>
+            </p:cNvCxnSpPr>
+            <p:nvPr/>
+          </p:nvCxnSpPr>
+          <p:spPr>
+            <a:xfrm>
+              <a:off x="587059" y="3902729"/>
+              <a:ext cx="1290812" cy="0"/>
+            </a:xfrm>
+            <a:prstGeom prst="straightConnector1">
+              <a:avLst/>
+            </a:prstGeom>
+            <a:ln w="28575">
+              <a:solidFill>
+                <a:schemeClr val="accent1"/>
+              </a:solidFill>
+              <a:tailEnd type="triangle"/>
+            </a:ln>
+          </p:spPr>
+          <p:style>
+            <a:lnRef idx="1">
+              <a:schemeClr val="accent1"/>
+            </a:lnRef>
+            <a:fillRef idx="0">
+              <a:schemeClr val="accent1"/>
+            </a:fillRef>
+            <a:effectRef idx="0">
+              <a:schemeClr val="accent1"/>
+            </a:effectRef>
+            <a:fontRef idx="minor">
+              <a:schemeClr val="tx1"/>
+            </a:fontRef>
+          </p:style>
+        </p:cxnSp>
+      </p:grpSp>
+      <p:sp>
+        <p:nvSpPr>
+          <p:cNvPr id="74" name="TextBox 73">
+            <a:extLst>
+              <a:ext uri="{FF2B5EF4-FFF2-40B4-BE49-F238E27FC236}">
+                <a16:creationId xmlns:a16="http://schemas.microsoft.com/office/drawing/2014/main" id="{0D35646D-6E36-3D4A-A8DC-E5982A5F0F75}"/>
+              </a:ext>
+            </a:extLst>
+          </p:cNvPr>
+          <p:cNvSpPr txBox="1"/>
+          <p:nvPr/>
+        </p:nvSpPr>
+        <p:spPr>
+          <a:xfrm>
+            <a:off x="5680361" y="1205099"/>
+            <a:ext cx="872836" cy="307777"/>
+          </a:xfrm>
+          <a:prstGeom prst="rect">
+            <a:avLst/>
+          </a:prstGeom>
+          <a:noFill/>
+        </p:spPr>
+        <p:txBody>
+          <a:bodyPr wrap="square" rtlCol="0">
+            <a:spAutoFit/>
+          </a:bodyPr>
+          <a:lstStyle/>
+          <a:p>
+            <a:pPr algn="ctr"/>
+            <a:r>
+              <a:rPr lang="de-DE" sz="1400" dirty="0" err="1"/>
+              <a:t>indicator</a:t>
+            </a:r>
+            <a:endParaRPr lang="de-DE" sz="1400" dirty="0"/>
+          </a:p>
+        </p:txBody>
+      </p:sp>
+      <p:sp>
+        <p:nvSpPr>
+          <p:cNvPr id="75" name="Rounded Rectangle 74">
+            <a:extLst>
+              <a:ext uri="{FF2B5EF4-FFF2-40B4-BE49-F238E27FC236}">
+                <a16:creationId xmlns:a16="http://schemas.microsoft.com/office/drawing/2014/main" id="{ED2ED06C-3D9E-E54C-B057-58628175E3AF}"/>
+              </a:ext>
+            </a:extLst>
+          </p:cNvPr>
+          <p:cNvSpPr/>
+          <p:nvPr/>
+        </p:nvSpPr>
+        <p:spPr>
+          <a:xfrm>
+            <a:off x="554766" y="3078757"/>
+            <a:ext cx="1323105" cy="412508"/>
+          </a:xfrm>
+          <a:prstGeom prst="roundRect">
+            <a:avLst/>
+          </a:prstGeom>
+        </p:spPr>
+        <p:style>
+          <a:lnRef idx="2">
+            <a:schemeClr val="accent3">
+              <a:shade val="50000"/>
+            </a:schemeClr>
+          </a:lnRef>
+          <a:fillRef idx="1">
+            <a:schemeClr val="accent3"/>
+          </a:fillRef>
+          <a:effectRef idx="0">
+            <a:schemeClr val="accent3"/>
+          </a:effectRef>
+          <a:fontRef idx="minor">
+            <a:schemeClr val="lt1"/>
+          </a:fontRef>
+        </p:style>
+        <p:txBody>
+          <a:bodyPr rtlCol="0" anchor="ctr"/>
+          <a:lstStyle/>
+          <a:p>
+            <a:pPr algn="ctr"/>
+            <a:r>
+              <a:rPr lang="de-DE" dirty="0" err="1"/>
+              <a:t>memory</a:t>
+            </a:r>
+            <a:endParaRPr lang="de-DE" dirty="0"/>
+          </a:p>
+        </p:txBody>
+      </p:sp>
+      <p:grpSp>
+        <p:nvGrpSpPr>
+          <p:cNvPr id="37" name="Group 36">
+            <a:extLst>
+              <a:ext uri="{FF2B5EF4-FFF2-40B4-BE49-F238E27FC236}">
+                <a16:creationId xmlns:a16="http://schemas.microsoft.com/office/drawing/2014/main" id="{02BB01C1-9776-1A41-A886-8CB39CA9FA68}"/>
+              </a:ext>
+            </a:extLst>
+          </p:cNvPr>
+          <p:cNvGrpSpPr/>
+          <p:nvPr/>
+        </p:nvGrpSpPr>
+        <p:grpSpPr>
+          <a:xfrm>
+            <a:off x="581809" y="4031130"/>
+            <a:ext cx="1290812" cy="307777"/>
+            <a:chOff x="587059" y="3594952"/>
+            <a:chExt cx="1290812" cy="307777"/>
+          </a:xfrm>
+        </p:grpSpPr>
+        <p:sp>
+          <p:nvSpPr>
+            <p:cNvPr id="39" name="TextBox 38">
+              <a:extLst>
+                <a:ext uri="{FF2B5EF4-FFF2-40B4-BE49-F238E27FC236}">
+                  <a16:creationId xmlns:a16="http://schemas.microsoft.com/office/drawing/2014/main" id="{D8402F4F-880B-D44A-B66B-66FEBFBA9DFA}"/>
+                </a:ext>
+              </a:extLst>
+            </p:cNvPr>
+            <p:cNvSpPr txBox="1"/>
+            <p:nvPr/>
+          </p:nvSpPr>
+          <p:spPr>
+            <a:xfrm>
+              <a:off x="645543" y="3594952"/>
+              <a:ext cx="1141550" cy="307777"/>
+            </a:xfrm>
+            <a:prstGeom prst="rect">
+              <a:avLst/>
+            </a:prstGeom>
+            <a:noFill/>
+          </p:spPr>
+          <p:txBody>
+            <a:bodyPr wrap="square" rtlCol="0">
+              <a:spAutoFit/>
+            </a:bodyPr>
+            <a:lstStyle/>
+            <a:p>
+              <a:pPr algn="ctr"/>
+              <a:r>
+                <a:rPr lang="de-DE" sz="1400" dirty="0" err="1"/>
+                <a:t>clientside</a:t>
+              </a:r>
+              <a:endParaRPr lang="de-DE" sz="1400" dirty="0"/>
+            </a:p>
+          </p:txBody>
+        </p:sp>
+        <p:cxnSp>
+          <p:nvCxnSpPr>
+            <p:cNvPr id="40" name="Straight Arrow Connector 39">
+              <a:extLst>
+                <a:ext uri="{FF2B5EF4-FFF2-40B4-BE49-F238E27FC236}">
+                  <a16:creationId xmlns:a16="http://schemas.microsoft.com/office/drawing/2014/main" id="{94C62116-A3EE-D34F-8221-2DF5F6F23A26}"/>
+                </a:ext>
+              </a:extLst>
+            </p:cNvPr>
+            <p:cNvCxnSpPr>
+              <a:cxnSpLocks/>
+            </p:cNvCxnSpPr>
+            <p:nvPr/>
+          </p:nvCxnSpPr>
+          <p:spPr>
+            <a:xfrm>
+              <a:off x="587059" y="3902729"/>
+              <a:ext cx="1290812" cy="0"/>
+            </a:xfrm>
+            <a:prstGeom prst="straightConnector1">
+              <a:avLst/>
+            </a:prstGeom>
+            <a:ln w="28575">
+              <a:solidFill>
+                <a:srgbClr val="FF0000"/>
+              </a:solidFill>
+              <a:tailEnd type="triangle"/>
+            </a:ln>
+          </p:spPr>
+          <p:style>
+            <a:lnRef idx="1">
+              <a:schemeClr val="accent1"/>
+            </a:lnRef>
+            <a:fillRef idx="0">
+              <a:schemeClr val="accent1"/>
+            </a:fillRef>
+            <a:effectRef idx="0">
+              <a:schemeClr val="accent1"/>
+            </a:effectRef>
+            <a:fontRef idx="minor">
+              <a:schemeClr val="tx1"/>
+            </a:fontRef>
+          </p:style>
+        </p:cxnSp>
+      </p:grpSp>
+    </p:spTree>
+    <p:extLst>
+      <p:ext uri="{BB962C8B-B14F-4D97-AF65-F5344CB8AC3E}">
+        <p14:creationId xmlns:p14="http://schemas.microsoft.com/office/powerpoint/2010/main" val="1310785069"/>
+      </p:ext>
+    </p:extLst>
+  </p:cSld>
+  <p:clrMapOvr>
+    <a:masterClrMapping/>
+  </p:clrMapOvr>
+</p:sld>
+</file>
+
+<file path=ppt/slides/slide5.xml><?xml version="1.0" encoding="utf-8"?>
+<p:sld xmlns:a="http://schemas.openxmlformats.org/drawingml/2006/main" xmlns:r="http://schemas.openxmlformats.org/officeDocument/2006/relationships" xmlns:p="http://schemas.openxmlformats.org/presentationml/2006/main">
+  <p:cSld>
+    <p:spTree>
+      <p:nvGrpSpPr>
+        <p:cNvPr id="1" name=""/>
+        <p:cNvGrpSpPr/>
+        <p:nvPr/>
+      </p:nvGrpSpPr>
+      <p:grpSpPr>
+        <a:xfrm>
+          <a:off x="0" y="0"/>
+          <a:ext cx="0" cy="0"/>
+          <a:chOff x="0" y="0"/>
+          <a:chExt cx="0" cy="0"/>
+        </a:xfrm>
+      </p:grpSpPr>
+      <p:sp>
+        <p:nvSpPr>
+          <p:cNvPr id="2" name="Title 1">
+            <a:extLst>
+              <a:ext uri="{FF2B5EF4-FFF2-40B4-BE49-F238E27FC236}">
+                <a16:creationId xmlns:a16="http://schemas.microsoft.com/office/drawing/2014/main" id="{1250287C-A3EE-1749-A544-C59F51281E8A}"/>
+              </a:ext>
+            </a:extLst>
+          </p:cNvPr>
+          <p:cNvSpPr>
+            <a:spLocks noGrp="1"/>
+          </p:cNvSpPr>
+          <p:nvPr>
+            <p:ph type="title"/>
+          </p:nvPr>
+        </p:nvSpPr>
+        <p:spPr/>
+        <p:txBody>
+          <a:bodyPr/>
+          <a:lstStyle/>
+          <a:p>
+            <a:r>
+              <a:rPr lang="de-DE" dirty="0" err="1"/>
+              <a:t>Map</a:t>
+            </a:r>
+            <a:r>
+              <a:rPr lang="de-DE" dirty="0"/>
+              <a:t> </a:t>
+            </a:r>
+            <a:r>
+              <a:rPr lang="de-DE" dirty="0" err="1"/>
+              <a:t>module</a:t>
+            </a:r>
+            <a:endParaRPr lang="de-DE" dirty="0"/>
+          </a:p>
+        </p:txBody>
+      </p:sp>
+      <p:sp>
+        <p:nvSpPr>
+          <p:cNvPr id="3" name="Content Placeholder 2">
+            <a:extLst>
+              <a:ext uri="{FF2B5EF4-FFF2-40B4-BE49-F238E27FC236}">
+                <a16:creationId xmlns:a16="http://schemas.microsoft.com/office/drawing/2014/main" id="{076CC565-072D-A041-8B58-0C5D3B36B194}"/>
+              </a:ext>
+            </a:extLst>
+          </p:cNvPr>
+          <p:cNvSpPr>
+            <a:spLocks noGrp="1"/>
+          </p:cNvSpPr>
+          <p:nvPr>
+            <p:ph idx="1"/>
+          </p:nvPr>
+        </p:nvSpPr>
+        <p:spPr/>
+        <p:txBody>
+          <a:bodyPr/>
+          <a:lstStyle/>
+          <a:p>
+            <a:endParaRPr lang="de-DE"/>
+          </a:p>
+        </p:txBody>
+      </p:sp>
+      <p:pic>
+        <p:nvPicPr>
+          <p:cNvPr id="4" name="Picture 3">
+            <a:extLst>
+              <a:ext uri="{FF2B5EF4-FFF2-40B4-BE49-F238E27FC236}">
+                <a16:creationId xmlns:a16="http://schemas.microsoft.com/office/drawing/2014/main" id="{4EB54A1E-07E3-5641-AFEE-9920D5FFB197}"/>
+              </a:ext>
+            </a:extLst>
+          </p:cNvPr>
+          <p:cNvPicPr>
+            <a:picLocks noChangeAspect="1"/>
+          </p:cNvPicPr>
+          <p:nvPr/>
+        </p:nvPicPr>
+        <p:blipFill rotWithShape="1">
+          <a:blip r:embed="rId2"/>
+          <a:srcRect l="674" t="446"/>
+          <a:stretch/>
+        </p:blipFill>
+        <p:spPr>
+          <a:xfrm>
+            <a:off x="173553" y="1415730"/>
+            <a:ext cx="11844894" cy="5171127"/>
+          </a:xfrm>
+          <a:prstGeom prst="rect">
+            <a:avLst/>
+          </a:prstGeom>
+        </p:spPr>
+      </p:pic>
+    </p:spTree>
+    <p:extLst>
+      <p:ext uri="{BB962C8B-B14F-4D97-AF65-F5344CB8AC3E}">
+        <p14:creationId xmlns:p14="http://schemas.microsoft.com/office/powerpoint/2010/main" val="4124855005"/>
+      </p:ext>
+    </p:extLst>
+  </p:cSld>
+  <p:clrMapOvr>
+    <a:masterClrMapping/>
+  </p:clrMapOvr>
+</p:sld>
+</file>
+
+<file path=ppt/slides/slide6.xml><?xml version="1.0" encoding="utf-8"?>
+<p:sld xmlns:a="http://schemas.openxmlformats.org/drawingml/2006/main" xmlns:r="http://schemas.openxmlformats.org/officeDocument/2006/relationships" xmlns:p="http://schemas.openxmlformats.org/presentationml/2006/main">
+  <p:cSld>
+    <p:spTree>
+      <p:nvGrpSpPr>
+        <p:cNvPr id="1" name=""/>
+        <p:cNvGrpSpPr/>
+        <p:nvPr/>
+      </p:nvGrpSpPr>
+      <p:grpSpPr>
+        <a:xfrm>
+          <a:off x="0" y="0"/>
+          <a:ext cx="0" cy="0"/>
+          <a:chOff x="0" y="0"/>
+          <a:chExt cx="0" cy="0"/>
+        </a:xfrm>
+      </p:grpSpPr>
+      <p:pic>
+        <p:nvPicPr>
+          <p:cNvPr id="4" name="Picture 3">
+            <a:extLst>
+              <a:ext uri="{FF2B5EF4-FFF2-40B4-BE49-F238E27FC236}">
+                <a16:creationId xmlns:a16="http://schemas.microsoft.com/office/drawing/2014/main" id="{255E5638-9D51-924F-A5A5-946028044BF7}"/>
+              </a:ext>
+            </a:extLst>
+          </p:cNvPr>
+          <p:cNvPicPr>
+            <a:picLocks noChangeAspect="1"/>
+          </p:cNvPicPr>
+          <p:nvPr/>
+        </p:nvPicPr>
+        <p:blipFill rotWithShape="1">
+          <a:blip r:embed="rId3"/>
+          <a:srcRect l="674" t="446"/>
+          <a:stretch/>
+        </p:blipFill>
+        <p:spPr>
+          <a:xfrm>
+            <a:off x="1880339" y="1776827"/>
+            <a:ext cx="4050103" cy="1768154"/>
+          </a:xfrm>
+          <a:prstGeom prst="rect">
+            <a:avLst/>
+          </a:prstGeom>
+        </p:spPr>
+      </p:pic>
+      <p:sp>
+        <p:nvSpPr>
+          <p:cNvPr id="12" name="Circular Arrow 11">
+            <a:extLst>
+              <a:ext uri="{FF2B5EF4-FFF2-40B4-BE49-F238E27FC236}">
+                <a16:creationId xmlns:a16="http://schemas.microsoft.com/office/drawing/2014/main" id="{6BE0C83A-40FC-A74E-8D7C-8CEA35E9E127}"/>
+              </a:ext>
+            </a:extLst>
+          </p:cNvPr>
+          <p:cNvSpPr/>
+          <p:nvPr/>
+        </p:nvSpPr>
+        <p:spPr>
+          <a:xfrm>
+            <a:off x="2400822" y="1329877"/>
+            <a:ext cx="1774299" cy="820538"/>
+          </a:xfrm>
+          <a:prstGeom prst="circularArrow">
+            <a:avLst>
+              <a:gd name="adj1" fmla="val 6196"/>
+              <a:gd name="adj2" fmla="val 275042"/>
+              <a:gd name="adj3" fmla="val 21279753"/>
+              <a:gd name="adj4" fmla="val 10822159"/>
+              <a:gd name="adj5" fmla="val 8226"/>
+            </a:avLst>
+          </a:prstGeom>
+          <a:ln>
+            <a:noFill/>
+          </a:ln>
+        </p:spPr>
+        <p:style>
+          <a:lnRef idx="2">
+            <a:schemeClr val="accent1">
+              <a:shade val="50000"/>
+            </a:schemeClr>
+          </a:lnRef>
+          <a:fillRef idx="1">
+            <a:schemeClr val="accent1"/>
+          </a:fillRef>
+          <a:effectRef idx="0">
+            <a:schemeClr val="accent1"/>
+          </a:effectRef>
+          <a:fontRef idx="minor">
+            <a:schemeClr val="lt1"/>
+          </a:fontRef>
+        </p:style>
+        <p:txBody>
+          <a:bodyPr rtlCol="0" anchor="ctr"/>
+          <a:lstStyle/>
+          <a:p>
+            <a:pPr algn="ctr"/>
+            <a:endParaRPr lang="de-DE">
+              <a:solidFill>
+                <a:schemeClr val="tx1"/>
+              </a:solidFill>
+            </a:endParaRPr>
+          </a:p>
+        </p:txBody>
+      </p:sp>
+      <p:sp>
+        <p:nvSpPr>
+          <p:cNvPr id="13" name="TextBox 12">
+            <a:extLst>
+              <a:ext uri="{FF2B5EF4-FFF2-40B4-BE49-F238E27FC236}">
+                <a16:creationId xmlns:a16="http://schemas.microsoft.com/office/drawing/2014/main" id="{C873BE98-C7D5-7C46-A4F7-D6F341FF6E4D}"/>
+              </a:ext>
+            </a:extLst>
+          </p:cNvPr>
+          <p:cNvSpPr txBox="1"/>
+          <p:nvPr/>
+        </p:nvSpPr>
+        <p:spPr>
+          <a:xfrm>
+            <a:off x="2952057" y="1066073"/>
+            <a:ext cx="543418" cy="307777"/>
+          </a:xfrm>
+          <a:prstGeom prst="rect">
+            <a:avLst/>
+          </a:prstGeom>
+          <a:noFill/>
+        </p:spPr>
+        <p:txBody>
+          <a:bodyPr wrap="none" rtlCol="0">
+            <a:spAutoFit/>
+          </a:bodyPr>
+          <a:lstStyle/>
+          <a:p>
+            <a:r>
+              <a:rPr lang="de-DE" sz="1400" dirty="0" err="1"/>
+              <a:t>bbox</a:t>
+            </a:r>
+            <a:endParaRPr lang="de-DE" sz="1400" dirty="0"/>
+          </a:p>
+        </p:txBody>
+      </p:sp>
+      <p:sp>
+        <p:nvSpPr>
+          <p:cNvPr id="15" name="Left Arrow 14">
+            <a:extLst>
+              <a:ext uri="{FF2B5EF4-FFF2-40B4-BE49-F238E27FC236}">
+                <a16:creationId xmlns:a16="http://schemas.microsoft.com/office/drawing/2014/main" id="{05DD6B4E-7878-D04C-959D-062D606A355F}"/>
+              </a:ext>
+            </a:extLst>
+          </p:cNvPr>
+          <p:cNvSpPr/>
+          <p:nvPr/>
+        </p:nvSpPr>
+        <p:spPr>
+          <a:xfrm rot="18674437">
+            <a:off x="2997054" y="3650243"/>
+            <a:ext cx="786969" cy="80599"/>
+          </a:xfrm>
+          <a:prstGeom prst="leftArrow">
+            <a:avLst/>
+          </a:prstGeom>
+          <a:solidFill>
+            <a:schemeClr val="accent1"/>
+          </a:solidFill>
+          <a:ln>
+            <a:noFill/>
+          </a:ln>
+        </p:spPr>
+        <p:style>
+          <a:lnRef idx="2">
+            <a:schemeClr val="accent1">
+              <a:shade val="50000"/>
+            </a:schemeClr>
+          </a:lnRef>
+          <a:fillRef idx="1">
+            <a:schemeClr val="accent1"/>
+          </a:fillRef>
+          <a:effectRef idx="0">
+            <a:schemeClr val="accent1"/>
+          </a:effectRef>
+          <a:fontRef idx="minor">
+            <a:schemeClr val="lt1"/>
+          </a:fontRef>
+        </p:style>
+        <p:txBody>
+          <a:bodyPr rtlCol="0" anchor="ctr"/>
+          <a:lstStyle/>
+          <a:p>
+            <a:pPr algn="ctr"/>
+            <a:endParaRPr lang="de-DE"/>
+          </a:p>
+        </p:txBody>
+      </p:sp>
+      <p:sp>
+        <p:nvSpPr>
+          <p:cNvPr id="16" name="Left Arrow 15">
+            <a:extLst>
+              <a:ext uri="{FF2B5EF4-FFF2-40B4-BE49-F238E27FC236}">
+                <a16:creationId xmlns:a16="http://schemas.microsoft.com/office/drawing/2014/main" id="{8B768200-186F-B744-9E34-5D22E0696A76}"/>
+              </a:ext>
+            </a:extLst>
+          </p:cNvPr>
+          <p:cNvSpPr/>
+          <p:nvPr/>
+        </p:nvSpPr>
+        <p:spPr>
+          <a:xfrm rot="14676363">
+            <a:off x="2066410" y="3362557"/>
+            <a:ext cx="1288120" cy="82996"/>
+          </a:xfrm>
+          <a:prstGeom prst="leftArrow">
+            <a:avLst/>
+          </a:prstGeom>
+          <a:solidFill>
+            <a:schemeClr val="accent1"/>
+          </a:solidFill>
+          <a:ln>
+            <a:noFill/>
+          </a:ln>
+        </p:spPr>
+        <p:style>
+          <a:lnRef idx="2">
+            <a:schemeClr val="accent1">
+              <a:shade val="50000"/>
+            </a:schemeClr>
+          </a:lnRef>
+          <a:fillRef idx="1">
+            <a:schemeClr val="accent1"/>
+          </a:fillRef>
+          <a:effectRef idx="0">
+            <a:schemeClr val="accent1"/>
+          </a:effectRef>
+          <a:fontRef idx="minor">
+            <a:schemeClr val="lt1"/>
+          </a:fontRef>
+        </p:style>
+        <p:txBody>
+          <a:bodyPr rtlCol="0" anchor="ctr"/>
+          <a:lstStyle/>
+          <a:p>
+            <a:pPr algn="ctr"/>
+            <a:endParaRPr lang="de-DE"/>
+          </a:p>
+        </p:txBody>
+      </p:sp>
+      <p:sp>
+        <p:nvSpPr>
+          <p:cNvPr id="17" name="TextBox 16">
+            <a:extLst>
+              <a:ext uri="{FF2B5EF4-FFF2-40B4-BE49-F238E27FC236}">
+                <a16:creationId xmlns:a16="http://schemas.microsoft.com/office/drawing/2014/main" id="{DD81F3DD-0CA4-3E4D-A1DB-03F5AD5912B0}"/>
+              </a:ext>
+            </a:extLst>
+          </p:cNvPr>
+          <p:cNvSpPr txBox="1"/>
+          <p:nvPr/>
+        </p:nvSpPr>
+        <p:spPr>
+          <a:xfrm>
+            <a:off x="2727054" y="3945995"/>
+            <a:ext cx="650371" cy="307777"/>
+          </a:xfrm>
+          <a:prstGeom prst="rect">
+            <a:avLst/>
+          </a:prstGeom>
+          <a:noFill/>
+        </p:spPr>
+        <p:txBody>
+          <a:bodyPr wrap="none" rtlCol="0">
+            <a:spAutoFit/>
+          </a:bodyPr>
+          <a:lstStyle/>
+          <a:p>
+            <a:r>
+              <a:rPr lang="de-DE" sz="1400" dirty="0" err="1"/>
+              <a:t>region</a:t>
+            </a:r>
+            <a:endParaRPr lang="de-DE" sz="1400" dirty="0"/>
+          </a:p>
+        </p:txBody>
+      </p:sp>
+      <p:sp>
+        <p:nvSpPr>
+          <p:cNvPr id="18" name="Left Arrow 17">
+            <a:extLst>
+              <a:ext uri="{FF2B5EF4-FFF2-40B4-BE49-F238E27FC236}">
+                <a16:creationId xmlns:a16="http://schemas.microsoft.com/office/drawing/2014/main" id="{0569654F-2DAD-6E48-A910-75027C2C932A}"/>
+              </a:ext>
+            </a:extLst>
+          </p:cNvPr>
+          <p:cNvSpPr/>
+          <p:nvPr/>
+        </p:nvSpPr>
+        <p:spPr>
+          <a:xfrm rot="10800000">
+            <a:off x="3310170" y="4076162"/>
+            <a:ext cx="393485" cy="87275"/>
+          </a:xfrm>
+          <a:prstGeom prst="leftArrow">
+            <a:avLst/>
+          </a:prstGeom>
+          <a:solidFill>
+            <a:srgbClr val="FF0000"/>
+          </a:solidFill>
+          <a:ln>
+            <a:noFill/>
+          </a:ln>
+        </p:spPr>
+        <p:style>
+          <a:lnRef idx="2">
+            <a:schemeClr val="accent1">
+              <a:shade val="50000"/>
+            </a:schemeClr>
+          </a:lnRef>
+          <a:fillRef idx="1">
+            <a:schemeClr val="accent1"/>
+          </a:fillRef>
+          <a:effectRef idx="0">
+            <a:schemeClr val="accent1"/>
+          </a:effectRef>
+          <a:fontRef idx="minor">
+            <a:schemeClr val="lt1"/>
+          </a:fontRef>
+        </p:style>
+        <p:txBody>
+          <a:bodyPr rtlCol="0" anchor="ctr"/>
+          <a:lstStyle/>
+          <a:p>
+            <a:pPr algn="ctr"/>
+            <a:endParaRPr lang="de-DE" dirty="0"/>
+          </a:p>
+        </p:txBody>
+      </p:sp>
+      <p:sp>
+        <p:nvSpPr>
+          <p:cNvPr id="19" name="Can 18">
+            <a:extLst>
+              <a:ext uri="{FF2B5EF4-FFF2-40B4-BE49-F238E27FC236}">
+                <a16:creationId xmlns:a16="http://schemas.microsoft.com/office/drawing/2014/main" id="{F7DE33BC-8686-DF43-B5F2-ACB212ACE307}"/>
+              </a:ext>
+            </a:extLst>
+          </p:cNvPr>
+          <p:cNvSpPr/>
+          <p:nvPr/>
+        </p:nvSpPr>
+        <p:spPr>
+          <a:xfrm>
+            <a:off x="7693299" y="4444245"/>
+            <a:ext cx="2511552" cy="1542288"/>
+          </a:xfrm>
+          <a:prstGeom prst="can">
+            <a:avLst/>
+          </a:prstGeom>
+          <a:solidFill>
+            <a:schemeClr val="accent1">
+              <a:alpha val="50000"/>
+            </a:schemeClr>
+          </a:solidFill>
+          <a:ln>
+            <a:noFill/>
+          </a:ln>
+        </p:spPr>
+        <p:style>
+          <a:lnRef idx="0">
+            <a:scrgbClr r="0" g="0" b="0"/>
+          </a:lnRef>
+          <a:fillRef idx="0">
+            <a:scrgbClr r="0" g="0" b="0"/>
+          </a:fillRef>
+          <a:effectRef idx="0">
+            <a:scrgbClr r="0" g="0" b="0"/>
+          </a:effectRef>
+          <a:fontRef idx="minor">
+            <a:schemeClr val="lt1"/>
+          </a:fontRef>
+        </p:style>
+        <p:txBody>
+          <a:bodyPr rtlCol="0" anchor="ctr"/>
+          <a:lstStyle/>
+          <a:p>
+            <a:pPr algn="ctr"/>
+            <a:r>
+              <a:rPr lang="de-DE" dirty="0"/>
+              <a:t>Server</a:t>
+            </a:r>
+          </a:p>
+        </p:txBody>
+      </p:sp>
+      <p:sp>
+        <p:nvSpPr>
+          <p:cNvPr id="20" name="Rounded Rectangle 19">
+            <a:extLst>
+              <a:ext uri="{FF2B5EF4-FFF2-40B4-BE49-F238E27FC236}">
+                <a16:creationId xmlns:a16="http://schemas.microsoft.com/office/drawing/2014/main" id="{4E4CA44F-E37A-034D-82E9-C8A00F6AD1DC}"/>
+              </a:ext>
+            </a:extLst>
+          </p:cNvPr>
+          <p:cNvSpPr/>
+          <p:nvPr/>
+        </p:nvSpPr>
+        <p:spPr>
+          <a:xfrm>
+            <a:off x="3813562" y="3923556"/>
+            <a:ext cx="1627632" cy="352654"/>
+          </a:xfrm>
+          <a:prstGeom prst="roundRect">
+            <a:avLst/>
+          </a:prstGeom>
+          <a:solidFill>
+            <a:schemeClr val="accent3">
+              <a:alpha val="50000"/>
+            </a:schemeClr>
+          </a:solidFill>
+          <a:ln>
+            <a:noFill/>
+          </a:ln>
+        </p:spPr>
+        <p:style>
+          <a:lnRef idx="0">
+            <a:scrgbClr r="0" g="0" b="0"/>
+          </a:lnRef>
+          <a:fillRef idx="0">
+            <a:scrgbClr r="0" g="0" b="0"/>
+          </a:fillRef>
+          <a:effectRef idx="0">
+            <a:scrgbClr r="0" g="0" b="0"/>
+          </a:effectRef>
+          <a:fontRef idx="minor">
+            <a:schemeClr val="lt1"/>
+          </a:fontRef>
+        </p:style>
+        <p:txBody>
+          <a:bodyPr rtlCol="0" anchor="ctr"/>
+          <a:lstStyle/>
+          <a:p>
+            <a:pPr algn="ctr"/>
+            <a:r>
+              <a:rPr lang="de-DE" dirty="0" err="1"/>
+              <a:t>state</a:t>
+            </a:r>
+            <a:endParaRPr lang="de-DE" dirty="0"/>
+          </a:p>
+        </p:txBody>
+      </p:sp>
+      <p:sp>
+        <p:nvSpPr>
+          <p:cNvPr id="22" name="Bent Arrow 21">
+            <a:extLst>
+              <a:ext uri="{FF2B5EF4-FFF2-40B4-BE49-F238E27FC236}">
+                <a16:creationId xmlns:a16="http://schemas.microsoft.com/office/drawing/2014/main" id="{AB0C075D-76D1-7A44-9563-B8030FA84053}"/>
+              </a:ext>
+            </a:extLst>
+          </p:cNvPr>
+          <p:cNvSpPr/>
+          <p:nvPr/>
+        </p:nvSpPr>
+        <p:spPr>
+          <a:xfrm flipH="1">
+            <a:off x="6120690" y="2572198"/>
+            <a:ext cx="3538987" cy="2072954"/>
+          </a:xfrm>
+          <a:prstGeom prst="bentArrow">
+            <a:avLst>
+              <a:gd name="adj1" fmla="val 1954"/>
+              <a:gd name="adj2" fmla="val 2184"/>
+              <a:gd name="adj3" fmla="val 4126"/>
+              <a:gd name="adj4" fmla="val 62367"/>
+            </a:avLst>
+          </a:prstGeom>
+          <a:solidFill>
+            <a:srgbClr val="FF0000"/>
+          </a:solidFill>
+          <a:ln>
+            <a:noFill/>
+          </a:ln>
+        </p:spPr>
+        <p:style>
+          <a:lnRef idx="2">
+            <a:schemeClr val="accent1">
+              <a:shade val="50000"/>
+            </a:schemeClr>
+          </a:lnRef>
+          <a:fillRef idx="1">
+            <a:schemeClr val="accent1"/>
+          </a:fillRef>
+          <a:effectRef idx="0">
+            <a:schemeClr val="accent1"/>
+          </a:effectRef>
+          <a:fontRef idx="minor">
+            <a:schemeClr val="lt1"/>
+          </a:fontRef>
+        </p:style>
+        <p:txBody>
+          <a:bodyPr rtlCol="0" anchor="ctr"/>
+          <a:lstStyle/>
+          <a:p>
+            <a:pPr algn="ctr"/>
+            <a:endParaRPr lang="de-DE">
+              <a:solidFill>
+                <a:schemeClr val="tx1"/>
+              </a:solidFill>
+            </a:endParaRPr>
+          </a:p>
+        </p:txBody>
+      </p:sp>
+      <p:sp>
+        <p:nvSpPr>
+          <p:cNvPr id="23" name="TextBox 22">
+            <a:extLst>
+              <a:ext uri="{FF2B5EF4-FFF2-40B4-BE49-F238E27FC236}">
+                <a16:creationId xmlns:a16="http://schemas.microsoft.com/office/drawing/2014/main" id="{BFE7EE00-A943-C94B-95D2-5D4FB66C96CA}"/>
+              </a:ext>
+            </a:extLst>
+          </p:cNvPr>
+          <p:cNvSpPr txBox="1"/>
+          <p:nvPr/>
+        </p:nvSpPr>
+        <p:spPr>
+          <a:xfrm>
+            <a:off x="2886739" y="4400633"/>
+            <a:ext cx="4083169" cy="1384995"/>
+          </a:xfrm>
+          <a:prstGeom prst="rect">
+            <a:avLst/>
+          </a:prstGeom>
+          <a:noFill/>
+        </p:spPr>
+        <p:txBody>
+          <a:bodyPr wrap="none" rtlCol="0">
+            <a:spAutoFit/>
+          </a:bodyPr>
+          <a:lstStyle/>
+          <a:p>
+            <a:r>
+              <a:rPr lang="de-DE" sz="1200" dirty="0">
+                <a:latin typeface="Lucida Sans Typewriter" panose="020B0509030504030204" pitchFamily="49" charset="77"/>
+                <a:ea typeface="Menlo" panose="020B0609030804020204" pitchFamily="49" charset="0"/>
+                <a:cs typeface="Menlo" panose="020B0609030804020204" pitchFamily="49" charset="0"/>
+              </a:rPr>
+              <a:t>{...,</a:t>
+            </a:r>
+          </a:p>
+          <a:p>
+            <a:r>
+              <a:rPr lang="de-DE" sz="1200" dirty="0">
+                <a:latin typeface="Lucida Sans Typewriter" panose="020B0509030504030204" pitchFamily="49" charset="77"/>
+                <a:ea typeface="Menlo" panose="020B0609030804020204" pitchFamily="49" charset="0"/>
+                <a:cs typeface="Menlo" panose="020B0609030804020204" pitchFamily="49" charset="0"/>
+              </a:rPr>
+              <a:t> ‘</a:t>
+            </a:r>
+            <a:r>
+              <a:rPr lang="de-DE" sz="1200" dirty="0" err="1">
+                <a:latin typeface="Lucida Sans Typewriter" panose="020B0509030504030204" pitchFamily="49" charset="77"/>
+                <a:ea typeface="Menlo" panose="020B0609030804020204" pitchFamily="49" charset="0"/>
+                <a:cs typeface="Menlo" panose="020B0609030804020204" pitchFamily="49" charset="0"/>
+              </a:rPr>
+              <a:t>regions</a:t>
+            </a:r>
+            <a:r>
+              <a:rPr lang="de-DE" sz="1200" dirty="0">
+                <a:latin typeface="Lucida Sans Typewriter" panose="020B0509030504030204" pitchFamily="49" charset="77"/>
+                <a:ea typeface="Menlo" panose="020B0609030804020204" pitchFamily="49" charset="0"/>
+                <a:cs typeface="Menlo" panose="020B0609030804020204" pitchFamily="49" charset="0"/>
+              </a:rPr>
+              <a:t>‘:{</a:t>
+            </a:r>
+          </a:p>
+          <a:p>
+            <a:r>
+              <a:rPr lang="de-DE" sz="1200" dirty="0">
+                <a:latin typeface="Lucida Sans Typewriter" panose="020B0509030504030204" pitchFamily="49" charset="77"/>
+                <a:ea typeface="Menlo" panose="020B0609030804020204" pitchFamily="49" charset="0"/>
+                <a:cs typeface="Menlo" panose="020B0609030804020204" pitchFamily="49" charset="0"/>
+              </a:rPr>
+              <a:t>	‘</a:t>
+            </a:r>
+            <a:r>
+              <a:rPr lang="de-DE" sz="1200" dirty="0" err="1">
+                <a:latin typeface="Lucida Sans Typewriter" panose="020B0509030504030204" pitchFamily="49" charset="77"/>
+                <a:ea typeface="Menlo" panose="020B0609030804020204" pitchFamily="49" charset="0"/>
+                <a:cs typeface="Menlo" panose="020B0609030804020204" pitchFamily="49" charset="0"/>
+              </a:rPr>
+              <a:t>selected</a:t>
+            </a:r>
+            <a:r>
+              <a:rPr lang="de-DE" sz="1200" dirty="0">
+                <a:latin typeface="Lucida Sans Typewriter" panose="020B0509030504030204" pitchFamily="49" charset="77"/>
+                <a:ea typeface="Menlo" panose="020B0609030804020204" pitchFamily="49" charset="0"/>
+                <a:cs typeface="Menlo" panose="020B0609030804020204" pitchFamily="49" charset="0"/>
+              </a:rPr>
+              <a:t>‘:[‘Europe‘, ‘France‘],</a:t>
+            </a:r>
+          </a:p>
+          <a:p>
+            <a:r>
+              <a:rPr lang="de-DE" sz="1200" dirty="0">
+                <a:latin typeface="Lucida Sans Typewriter" panose="020B0509030504030204" pitchFamily="49" charset="77"/>
+                <a:ea typeface="Menlo" panose="020B0609030804020204" pitchFamily="49" charset="0"/>
+                <a:cs typeface="Menlo" panose="020B0609030804020204" pitchFamily="49" charset="0"/>
+              </a:rPr>
+              <a:t>	‘</a:t>
+            </a:r>
+            <a:r>
+              <a:rPr lang="de-DE" sz="1200" dirty="0" err="1">
+                <a:latin typeface="Lucida Sans Typewriter" panose="020B0509030504030204" pitchFamily="49" charset="77"/>
+                <a:ea typeface="Menlo" panose="020B0609030804020204" pitchFamily="49" charset="0"/>
+                <a:cs typeface="Menlo" panose="020B0609030804020204" pitchFamily="49" charset="0"/>
+              </a:rPr>
+              <a:t>active</a:t>
+            </a:r>
+            <a:r>
+              <a:rPr lang="de-DE" sz="1200" dirty="0">
+                <a:latin typeface="Lucida Sans Typewriter" panose="020B0509030504030204" pitchFamily="49" charset="77"/>
+                <a:ea typeface="Menlo" panose="020B0609030804020204" pitchFamily="49" charset="0"/>
+                <a:cs typeface="Menlo" panose="020B0609030804020204" pitchFamily="49" charset="0"/>
+              </a:rPr>
+              <a:t>‘: ‘Europe‘}</a:t>
+            </a:r>
+          </a:p>
+          <a:p>
+            <a:r>
+              <a:rPr lang="de-DE" sz="1200" dirty="0">
+                <a:latin typeface="Lucida Sans Typewriter" panose="020B0509030504030204" pitchFamily="49" charset="77"/>
+                <a:ea typeface="Menlo" panose="020B0609030804020204" pitchFamily="49" charset="0"/>
+                <a:cs typeface="Menlo" panose="020B0609030804020204" pitchFamily="49" charset="0"/>
+              </a:rPr>
+              <a:t> ...}</a:t>
+            </a:r>
+          </a:p>
+          <a:p>
+            <a:r>
+              <a:rPr lang="de-DE" sz="1200" dirty="0">
+                <a:latin typeface="Lucida Sans Typewriter" panose="020B0509030504030204" pitchFamily="49" charset="77"/>
+                <a:ea typeface="Menlo" panose="020B0609030804020204" pitchFamily="49" charset="0"/>
+                <a:cs typeface="Menlo" panose="020B0609030804020204" pitchFamily="49" charset="0"/>
+              </a:rPr>
+              <a:t> 	</a:t>
+            </a:r>
+          </a:p>
+          <a:p>
+            <a:endParaRPr lang="de-DE" sz="1200" dirty="0">
+              <a:latin typeface="Lucida Sans Typewriter" panose="020B0509030504030204" pitchFamily="49" charset="77"/>
+              <a:ea typeface="Menlo" panose="020B0609030804020204" pitchFamily="49" charset="0"/>
+              <a:cs typeface="Menlo" panose="020B0609030804020204" pitchFamily="49" charset="0"/>
+            </a:endParaRPr>
+          </a:p>
+        </p:txBody>
+      </p:sp>
+      <p:sp>
+        <p:nvSpPr>
+          <p:cNvPr id="24" name="TextBox 23">
+            <a:extLst>
+              <a:ext uri="{FF2B5EF4-FFF2-40B4-BE49-F238E27FC236}">
+                <a16:creationId xmlns:a16="http://schemas.microsoft.com/office/drawing/2014/main" id="{888BC8FC-F109-E64F-8531-A17DBC9B9170}"/>
+              </a:ext>
+            </a:extLst>
+          </p:cNvPr>
+          <p:cNvSpPr txBox="1"/>
+          <p:nvPr/>
+        </p:nvSpPr>
+        <p:spPr>
+          <a:xfrm>
+            <a:off x="6592158" y="1264180"/>
+            <a:ext cx="4641014" cy="1569660"/>
+          </a:xfrm>
+          <a:prstGeom prst="rect">
+            <a:avLst/>
+          </a:prstGeom>
+          <a:noFill/>
+        </p:spPr>
+        <p:txBody>
+          <a:bodyPr wrap="none" rtlCol="0">
+            <a:spAutoFit/>
+          </a:bodyPr>
+          <a:lstStyle/>
+          <a:p>
+            <a:r>
+              <a:rPr lang="de-DE" sz="1200" dirty="0">
+                <a:latin typeface="Lucida Sans Typewriter" panose="020B0509030504030204" pitchFamily="49" charset="77"/>
+                <a:ea typeface="Menlo" panose="020B0609030804020204" pitchFamily="49" charset="0"/>
+                <a:cs typeface="Menlo" panose="020B0609030804020204" pitchFamily="49" charset="0"/>
+              </a:rPr>
+              <a:t>{...,</a:t>
+            </a:r>
+          </a:p>
+          <a:p>
+            <a:r>
+              <a:rPr lang="de-DE" sz="1200" dirty="0">
+                <a:latin typeface="Lucida Sans Typewriter" panose="020B0509030504030204" pitchFamily="49" charset="77"/>
+                <a:ea typeface="Menlo" panose="020B0609030804020204" pitchFamily="49" charset="0"/>
+                <a:cs typeface="Menlo" panose="020B0609030804020204" pitchFamily="49" charset="0"/>
+              </a:rPr>
+              <a:t> ‘</a:t>
+            </a:r>
+            <a:r>
+              <a:rPr lang="de-DE" sz="1200" dirty="0" err="1">
+                <a:latin typeface="Lucida Sans Typewriter" panose="020B0509030504030204" pitchFamily="49" charset="77"/>
+                <a:ea typeface="Menlo" panose="020B0609030804020204" pitchFamily="49" charset="0"/>
+                <a:cs typeface="Menlo" panose="020B0609030804020204" pitchFamily="49" charset="0"/>
+              </a:rPr>
+              <a:t>indicator</a:t>
+            </a:r>
+            <a:r>
+              <a:rPr lang="de-DE" sz="1200" dirty="0">
+                <a:latin typeface="Lucida Sans Typewriter" panose="020B0509030504030204" pitchFamily="49" charset="77"/>
+                <a:ea typeface="Menlo" panose="020B0609030804020204" pitchFamily="49" charset="0"/>
+                <a:cs typeface="Menlo" panose="020B0609030804020204" pitchFamily="49" charset="0"/>
+              </a:rPr>
+              <a:t>‘:‘</a:t>
+            </a:r>
+            <a:r>
+              <a:rPr lang="de-DE" sz="1200" dirty="0" err="1">
+                <a:latin typeface="Lucida Sans Typewriter" panose="020B0509030504030204" pitchFamily="49" charset="77"/>
+                <a:ea typeface="Menlo" panose="020B0609030804020204" pitchFamily="49" charset="0"/>
+                <a:cs typeface="Menlo" panose="020B0609030804020204" pitchFamily="49" charset="0"/>
+              </a:rPr>
+              <a:t>cases</a:t>
+            </a:r>
+            <a:r>
+              <a:rPr lang="de-DE" sz="1200" dirty="0">
+                <a:latin typeface="Lucida Sans Typewriter" panose="020B0509030504030204" pitchFamily="49" charset="77"/>
+                <a:ea typeface="Menlo" panose="020B0609030804020204" pitchFamily="49" charset="0"/>
+                <a:cs typeface="Menlo" panose="020B0609030804020204" pitchFamily="49" charset="0"/>
+              </a:rPr>
+              <a:t>‘,</a:t>
+            </a:r>
+          </a:p>
+          <a:p>
+            <a:r>
+              <a:rPr lang="de-DE" sz="1200" dirty="0">
+                <a:latin typeface="Lucida Sans Typewriter" panose="020B0509030504030204" pitchFamily="49" charset="77"/>
+                <a:ea typeface="Menlo" panose="020B0609030804020204" pitchFamily="49" charset="0"/>
+                <a:cs typeface="Menlo" panose="020B0609030804020204" pitchFamily="49" charset="0"/>
+              </a:rPr>
+              <a:t> ‘</a:t>
+            </a:r>
+            <a:r>
+              <a:rPr lang="de-DE" sz="1200" dirty="0" err="1">
+                <a:latin typeface="Lucida Sans Typewriter" panose="020B0509030504030204" pitchFamily="49" charset="77"/>
+                <a:ea typeface="Menlo" panose="020B0609030804020204" pitchFamily="49" charset="0"/>
+                <a:cs typeface="Menlo" panose="020B0609030804020204" pitchFamily="49" charset="0"/>
+              </a:rPr>
+              <a:t>map</a:t>
+            </a:r>
+            <a:r>
+              <a:rPr lang="de-DE" sz="1200" dirty="0">
+                <a:latin typeface="Lucida Sans Typewriter" panose="020B0509030504030204" pitchFamily="49" charset="77"/>
+                <a:ea typeface="Menlo" panose="020B0609030804020204" pitchFamily="49" charset="0"/>
+                <a:cs typeface="Menlo" panose="020B0609030804020204" pitchFamily="49" charset="0"/>
+              </a:rPr>
+              <a:t>‘:{</a:t>
+            </a:r>
+          </a:p>
+          <a:p>
+            <a:r>
+              <a:rPr lang="de-DE" sz="1200" dirty="0">
+                <a:latin typeface="Lucida Sans Typewriter" panose="020B0509030504030204" pitchFamily="49" charset="77"/>
+                <a:ea typeface="Menlo" panose="020B0609030804020204" pitchFamily="49" charset="0"/>
+                <a:cs typeface="Menlo" panose="020B0609030804020204" pitchFamily="49" charset="0"/>
+              </a:rPr>
+              <a:t>	‘France‘:{‘iso3‘,‘FRA‘,'value‘:2034},</a:t>
+            </a:r>
+          </a:p>
+          <a:p>
+            <a:r>
+              <a:rPr lang="de-DE" sz="1200" dirty="0">
+                <a:latin typeface="Lucida Sans Typewriter" panose="020B0509030504030204" pitchFamily="49" charset="77"/>
+                <a:ea typeface="Menlo" panose="020B0609030804020204" pitchFamily="49" charset="0"/>
+                <a:cs typeface="Menlo" panose="020B0609030804020204" pitchFamily="49" charset="0"/>
+              </a:rPr>
+              <a:t>	‘Germany‘:{‘iso3‘,‘DEU‘,'value‘:1355},</a:t>
+            </a:r>
+          </a:p>
+          <a:p>
+            <a:r>
+              <a:rPr lang="de-DE" sz="1200" dirty="0">
+                <a:latin typeface="Lucida Sans Typewriter" panose="020B0509030504030204" pitchFamily="49" charset="77"/>
+                <a:ea typeface="Menlo" panose="020B0609030804020204" pitchFamily="49" charset="0"/>
+                <a:cs typeface="Menlo" panose="020B0609030804020204" pitchFamily="49" charset="0"/>
+              </a:rPr>
+              <a:t>...}</a:t>
+            </a:r>
+          </a:p>
+          <a:p>
+            <a:r>
+              <a:rPr lang="de-DE" sz="1200" dirty="0">
+                <a:latin typeface="Lucida Sans Typewriter" panose="020B0509030504030204" pitchFamily="49" charset="77"/>
+                <a:ea typeface="Menlo" panose="020B0609030804020204" pitchFamily="49" charset="0"/>
+                <a:cs typeface="Menlo" panose="020B0609030804020204" pitchFamily="49" charset="0"/>
+              </a:rPr>
+              <a:t> 	</a:t>
+            </a:r>
+          </a:p>
+          <a:p>
+            <a:endParaRPr lang="de-DE" sz="1200" dirty="0">
+              <a:latin typeface="Lucida Sans Typewriter" panose="020B0509030504030204" pitchFamily="49" charset="77"/>
+              <a:ea typeface="Menlo" panose="020B0609030804020204" pitchFamily="49" charset="0"/>
+              <a:cs typeface="Menlo" panose="020B0609030804020204" pitchFamily="49" charset="0"/>
+            </a:endParaRPr>
+          </a:p>
+        </p:txBody>
+      </p:sp>
+      <p:sp>
+        <p:nvSpPr>
+          <p:cNvPr id="25" name="Left Arrow 24">
+            <a:extLst>
+              <a:ext uri="{FF2B5EF4-FFF2-40B4-BE49-F238E27FC236}">
+                <a16:creationId xmlns:a16="http://schemas.microsoft.com/office/drawing/2014/main" id="{85C8E475-3C99-BC41-A645-AE5FBFE20A34}"/>
+              </a:ext>
+            </a:extLst>
+          </p:cNvPr>
+          <p:cNvSpPr/>
+          <p:nvPr/>
+        </p:nvSpPr>
+        <p:spPr>
+          <a:xfrm rot="10800000">
+            <a:off x="318976" y="299216"/>
+            <a:ext cx="321353" cy="72924"/>
+          </a:xfrm>
+          <a:prstGeom prst="leftArrow">
+            <a:avLst/>
+          </a:prstGeom>
+          <a:solidFill>
+            <a:schemeClr val="accent1"/>
+          </a:solidFill>
+          <a:ln>
+            <a:noFill/>
+          </a:ln>
+        </p:spPr>
+        <p:style>
+          <a:lnRef idx="2">
+            <a:schemeClr val="accent1">
+              <a:shade val="50000"/>
+            </a:schemeClr>
+          </a:lnRef>
+          <a:fillRef idx="1">
+            <a:schemeClr val="accent1"/>
+          </a:fillRef>
+          <a:effectRef idx="0">
+            <a:schemeClr val="accent1"/>
+          </a:effectRef>
+          <a:fontRef idx="minor">
+            <a:schemeClr val="lt1"/>
+          </a:fontRef>
+        </p:style>
+        <p:txBody>
+          <a:bodyPr rtlCol="0" anchor="ctr"/>
+          <a:lstStyle/>
+          <a:p>
+            <a:pPr algn="ctr"/>
+            <a:endParaRPr lang="de-DE"/>
+          </a:p>
+        </p:txBody>
+      </p:sp>
+      <p:sp>
+        <p:nvSpPr>
+          <p:cNvPr id="26" name="TextBox 25">
+            <a:extLst>
+              <a:ext uri="{FF2B5EF4-FFF2-40B4-BE49-F238E27FC236}">
+                <a16:creationId xmlns:a16="http://schemas.microsoft.com/office/drawing/2014/main" id="{3E50D95C-420E-5B41-A56C-DA7013DC3AAD}"/>
+              </a:ext>
+            </a:extLst>
+          </p:cNvPr>
+          <p:cNvSpPr txBox="1"/>
+          <p:nvPr/>
+        </p:nvSpPr>
+        <p:spPr>
+          <a:xfrm>
+            <a:off x="640329" y="181789"/>
+            <a:ext cx="923586" cy="307777"/>
+          </a:xfrm>
+          <a:prstGeom prst="rect">
+            <a:avLst/>
+          </a:prstGeom>
+          <a:noFill/>
+        </p:spPr>
+        <p:txBody>
+          <a:bodyPr wrap="none" rtlCol="0">
+            <a:spAutoFit/>
+          </a:bodyPr>
+          <a:lstStyle/>
+          <a:p>
+            <a:r>
+              <a:rPr lang="de-DE" sz="1400" dirty="0" err="1"/>
+              <a:t>client</a:t>
+            </a:r>
+            <a:r>
+              <a:rPr lang="de-DE" sz="1400" dirty="0"/>
+              <a:t> </a:t>
+            </a:r>
+            <a:r>
+              <a:rPr lang="de-DE" sz="1400" dirty="0" err="1"/>
+              <a:t>side</a:t>
+            </a:r>
+            <a:endParaRPr lang="de-DE" sz="1400" dirty="0"/>
+          </a:p>
+        </p:txBody>
+      </p:sp>
+      <p:sp>
+        <p:nvSpPr>
+          <p:cNvPr id="27" name="Left Arrow 26">
+            <a:extLst>
+              <a:ext uri="{FF2B5EF4-FFF2-40B4-BE49-F238E27FC236}">
+                <a16:creationId xmlns:a16="http://schemas.microsoft.com/office/drawing/2014/main" id="{A9901E12-9199-CD4E-BF36-26484956CE8A}"/>
+              </a:ext>
+            </a:extLst>
+          </p:cNvPr>
+          <p:cNvSpPr/>
+          <p:nvPr/>
+        </p:nvSpPr>
+        <p:spPr>
+          <a:xfrm rot="10800000">
+            <a:off x="322518" y="552624"/>
+            <a:ext cx="321353" cy="72924"/>
+          </a:xfrm>
+          <a:prstGeom prst="leftArrow">
+            <a:avLst/>
+          </a:prstGeom>
+          <a:solidFill>
+            <a:srgbClr val="FF0000"/>
+          </a:solidFill>
+          <a:ln>
+            <a:noFill/>
+          </a:ln>
+        </p:spPr>
+        <p:style>
+          <a:lnRef idx="2">
+            <a:schemeClr val="accent1">
+              <a:shade val="50000"/>
+            </a:schemeClr>
+          </a:lnRef>
+          <a:fillRef idx="1">
+            <a:schemeClr val="accent1"/>
+          </a:fillRef>
+          <a:effectRef idx="0">
+            <a:schemeClr val="accent1"/>
+          </a:effectRef>
+          <a:fontRef idx="minor">
+            <a:schemeClr val="lt1"/>
+          </a:fontRef>
+        </p:style>
+        <p:txBody>
+          <a:bodyPr rtlCol="0" anchor="ctr"/>
+          <a:lstStyle/>
+          <a:p>
+            <a:pPr algn="ctr"/>
+            <a:endParaRPr lang="de-DE"/>
+          </a:p>
+        </p:txBody>
+      </p:sp>
+      <p:sp>
+        <p:nvSpPr>
+          <p:cNvPr id="28" name="TextBox 27">
+            <a:extLst>
+              <a:ext uri="{FF2B5EF4-FFF2-40B4-BE49-F238E27FC236}">
+                <a16:creationId xmlns:a16="http://schemas.microsoft.com/office/drawing/2014/main" id="{057F6DC1-E9DF-EE4D-B3D0-B6B63029686F}"/>
+              </a:ext>
+            </a:extLst>
+          </p:cNvPr>
+          <p:cNvSpPr txBox="1"/>
+          <p:nvPr/>
+        </p:nvSpPr>
+        <p:spPr>
+          <a:xfrm>
+            <a:off x="643871" y="435197"/>
+            <a:ext cx="978088" cy="307777"/>
+          </a:xfrm>
+          <a:prstGeom prst="rect">
+            <a:avLst/>
+          </a:prstGeom>
+          <a:noFill/>
+        </p:spPr>
+        <p:txBody>
+          <a:bodyPr wrap="none" rtlCol="0">
+            <a:spAutoFit/>
+          </a:bodyPr>
+          <a:lstStyle/>
+          <a:p>
+            <a:r>
+              <a:rPr lang="de-DE" sz="1400" dirty="0" err="1"/>
+              <a:t>server</a:t>
+            </a:r>
+            <a:r>
+              <a:rPr lang="de-DE" sz="1400" dirty="0"/>
+              <a:t> </a:t>
+            </a:r>
+            <a:r>
+              <a:rPr lang="de-DE" sz="1400" dirty="0" err="1"/>
+              <a:t>side</a:t>
+            </a:r>
+            <a:endParaRPr lang="de-DE" sz="1400" dirty="0"/>
+          </a:p>
+        </p:txBody>
+      </p:sp>
+      <p:sp>
+        <p:nvSpPr>
+          <p:cNvPr id="29" name="Bent Arrow 28">
+            <a:extLst>
+              <a:ext uri="{FF2B5EF4-FFF2-40B4-BE49-F238E27FC236}">
+                <a16:creationId xmlns:a16="http://schemas.microsoft.com/office/drawing/2014/main" id="{4D7E774D-944E-F747-AE4E-066201C4391D}"/>
+              </a:ext>
+            </a:extLst>
+          </p:cNvPr>
+          <p:cNvSpPr/>
+          <p:nvPr/>
+        </p:nvSpPr>
+        <p:spPr>
+          <a:xfrm rot="5400000">
+            <a:off x="6622000" y="3028683"/>
+            <a:ext cx="568991" cy="2663952"/>
+          </a:xfrm>
+          <a:prstGeom prst="bentArrow">
+            <a:avLst>
+              <a:gd name="adj1" fmla="val 7427"/>
+              <a:gd name="adj2" fmla="val 7449"/>
+              <a:gd name="adj3" fmla="val 17121"/>
+              <a:gd name="adj4" fmla="val 62367"/>
+            </a:avLst>
+          </a:prstGeom>
+          <a:solidFill>
+            <a:srgbClr val="FF0000"/>
+          </a:solidFill>
+          <a:ln>
+            <a:noFill/>
+          </a:ln>
+        </p:spPr>
+        <p:style>
+          <a:lnRef idx="2">
+            <a:schemeClr val="accent1">
+              <a:shade val="50000"/>
+            </a:schemeClr>
+          </a:lnRef>
+          <a:fillRef idx="1">
+            <a:schemeClr val="accent1"/>
+          </a:fillRef>
+          <a:effectRef idx="0">
+            <a:schemeClr val="accent1"/>
+          </a:effectRef>
+          <a:fontRef idx="minor">
+            <a:schemeClr val="lt1"/>
+          </a:fontRef>
+        </p:style>
+        <p:txBody>
+          <a:bodyPr rtlCol="0" anchor="ctr"/>
+          <a:lstStyle/>
+          <a:p>
+            <a:pPr algn="ctr"/>
+            <a:endParaRPr lang="de-DE">
+              <a:solidFill>
+                <a:schemeClr val="tx1"/>
+              </a:solidFill>
+            </a:endParaRPr>
+          </a:p>
+        </p:txBody>
+      </p:sp>
+    </p:spTree>
+    <p:extLst>
+      <p:ext uri="{BB962C8B-B14F-4D97-AF65-F5344CB8AC3E}">
+        <p14:creationId xmlns:p14="http://schemas.microsoft.com/office/powerpoint/2010/main" val="1175861388"/>
+      </p:ext>
+    </p:extLst>
+  </p:cSld>
+  <p:clrMapOvr>
+    <a:masterClrMapping/>
+  </p:clrMapOvr>
+</p:sld>
+</file>
+
+<file path=ppt/slides/slide7.xml><?xml version="1.0" encoding="utf-8"?>
+<p:sld xmlns:a="http://schemas.openxmlformats.org/drawingml/2006/main" xmlns:r="http://schemas.openxmlformats.org/officeDocument/2006/relationships" xmlns:p="http://schemas.openxmlformats.org/presentationml/2006/main">
+  <p:cSld>
+    <p:spTree>
+      <p:nvGrpSpPr>
+        <p:cNvPr id="1" name=""/>
+        <p:cNvGrpSpPr/>
+        <p:nvPr/>
+      </p:nvGrpSpPr>
+      <p:grpSpPr>
+        <a:xfrm>
+          <a:off x="0" y="0"/>
+          <a:ext cx="0" cy="0"/>
+          <a:chOff x="0" y="0"/>
+          <a:chExt cx="0" cy="0"/>
+        </a:xfrm>
+      </p:grpSpPr>
+      <p:sp>
+        <p:nvSpPr>
+          <p:cNvPr id="2" name="Title 1">
+            <a:extLst>
+              <a:ext uri="{FF2B5EF4-FFF2-40B4-BE49-F238E27FC236}">
+                <a16:creationId xmlns:a16="http://schemas.microsoft.com/office/drawing/2014/main" id="{24DD1EDD-BF2C-9042-9C12-52977D93DBF4}"/>
+              </a:ext>
+            </a:extLst>
+          </p:cNvPr>
+          <p:cNvSpPr>
+            <a:spLocks noGrp="1"/>
+          </p:cNvSpPr>
+          <p:nvPr>
+            <p:ph type="title"/>
+          </p:nvPr>
+        </p:nvSpPr>
+        <p:spPr/>
+        <p:txBody>
+          <a:bodyPr/>
+          <a:lstStyle/>
+          <a:p>
+            <a:r>
+              <a:rPr lang="de-DE" dirty="0"/>
+              <a:t>MVC (</a:t>
+            </a:r>
+            <a:r>
+              <a:rPr lang="de-DE" dirty="0" err="1"/>
+              <a:t>model</a:t>
+            </a:r>
+            <a:r>
+              <a:rPr lang="de-DE" dirty="0"/>
+              <a:t> –</a:t>
+            </a:r>
+            <a:r>
+              <a:rPr lang="de-DE" dirty="0" err="1"/>
+              <a:t>view</a:t>
+            </a:r>
+            <a:r>
+              <a:rPr lang="de-DE" dirty="0"/>
+              <a:t> – </a:t>
+            </a:r>
+            <a:r>
+              <a:rPr lang="de-DE" dirty="0" err="1"/>
+              <a:t>control</a:t>
+            </a:r>
+            <a:r>
+              <a:rPr lang="de-DE" dirty="0"/>
+              <a:t>	</a:t>
+            </a:r>
+            <a:r>
+              <a:rPr lang="de-DE" dirty="0" err="1"/>
+              <a:t>ler</a:t>
+            </a:r>
+            <a:r>
+              <a:rPr lang="de-DE" dirty="0"/>
+              <a:t>)</a:t>
+            </a:r>
+          </a:p>
+        </p:txBody>
+      </p:sp>
+      <p:sp>
+        <p:nvSpPr>
+          <p:cNvPr id="4" name="Rounded Rectangle 3">
+            <a:extLst>
+              <a:ext uri="{FF2B5EF4-FFF2-40B4-BE49-F238E27FC236}">
+                <a16:creationId xmlns:a16="http://schemas.microsoft.com/office/drawing/2014/main" id="{570F1C21-70D5-E54A-BC1A-F1A3CB7E44AD}"/>
+              </a:ext>
+            </a:extLst>
+          </p:cNvPr>
+          <p:cNvSpPr/>
+          <p:nvPr/>
+        </p:nvSpPr>
+        <p:spPr>
+          <a:xfrm>
+            <a:off x="2186280" y="3443824"/>
+            <a:ext cx="1311563" cy="554182"/>
+          </a:xfrm>
+          <a:prstGeom prst="roundRect">
+            <a:avLst/>
+          </a:prstGeom>
+        </p:spPr>
+        <p:style>
+          <a:lnRef idx="2">
+            <a:schemeClr val="accent5">
+              <a:shade val="50000"/>
+            </a:schemeClr>
+          </a:lnRef>
+          <a:fillRef idx="1">
+            <a:schemeClr val="accent5"/>
+          </a:fillRef>
+          <a:effectRef idx="0">
+            <a:schemeClr val="accent5"/>
+          </a:effectRef>
+          <a:fontRef idx="minor">
+            <a:schemeClr val="lt1"/>
+          </a:fontRef>
+        </p:style>
+        <p:txBody>
+          <a:bodyPr rtlCol="0" anchor="ctr"/>
+          <a:lstStyle/>
+          <a:p>
+            <a:pPr algn="ctr"/>
+            <a:r>
+              <a:rPr lang="de-DE" dirty="0" err="1"/>
+              <a:t>user</a:t>
+            </a:r>
+            <a:endParaRPr lang="de-DE" dirty="0"/>
+          </a:p>
+        </p:txBody>
+      </p:sp>
+      <p:sp>
+        <p:nvSpPr>
+          <p:cNvPr id="5" name="Rounded Rectangle 4">
+            <a:extLst>
+              <a:ext uri="{FF2B5EF4-FFF2-40B4-BE49-F238E27FC236}">
+                <a16:creationId xmlns:a16="http://schemas.microsoft.com/office/drawing/2014/main" id="{5415519E-4C93-8145-AC69-A036D3AB5855}"/>
+              </a:ext>
+            </a:extLst>
+          </p:cNvPr>
+          <p:cNvSpPr/>
+          <p:nvPr/>
+        </p:nvSpPr>
+        <p:spPr>
+          <a:xfrm>
+            <a:off x="4844467" y="2308079"/>
+            <a:ext cx="1311563" cy="554182"/>
+          </a:xfrm>
+          <a:prstGeom prst="roundRect">
+            <a:avLst/>
+          </a:prstGeom>
+        </p:spPr>
+        <p:style>
+          <a:lnRef idx="2">
+            <a:schemeClr val="accent2">
+              <a:shade val="50000"/>
+            </a:schemeClr>
+          </a:lnRef>
+          <a:fillRef idx="1">
+            <a:schemeClr val="accent2"/>
+          </a:fillRef>
+          <a:effectRef idx="0">
+            <a:schemeClr val="accent2"/>
+          </a:effectRef>
+          <a:fontRef idx="minor">
+            <a:schemeClr val="lt1"/>
+          </a:fontRef>
+        </p:style>
+        <p:txBody>
+          <a:bodyPr rtlCol="0" anchor="ctr"/>
+          <a:lstStyle/>
+          <a:p>
+            <a:pPr algn="ctr"/>
+            <a:r>
+              <a:rPr lang="de-DE" dirty="0" err="1"/>
+              <a:t>controller</a:t>
+            </a:r>
+            <a:endParaRPr lang="de-DE" dirty="0"/>
+          </a:p>
+        </p:txBody>
+      </p:sp>
+      <p:sp>
+        <p:nvSpPr>
+          <p:cNvPr id="7" name="Rounded Rectangle 6">
+            <a:extLst>
+              <a:ext uri="{FF2B5EF4-FFF2-40B4-BE49-F238E27FC236}">
+                <a16:creationId xmlns:a16="http://schemas.microsoft.com/office/drawing/2014/main" id="{96261826-7F6E-2049-8960-6BFE9FE123BF}"/>
+              </a:ext>
+            </a:extLst>
+          </p:cNvPr>
+          <p:cNvSpPr/>
+          <p:nvPr/>
+        </p:nvSpPr>
+        <p:spPr>
+          <a:xfrm>
+            <a:off x="7419106" y="3474770"/>
+            <a:ext cx="1311563" cy="554182"/>
+          </a:xfrm>
+          <a:prstGeom prst="roundRect">
+            <a:avLst/>
+          </a:prstGeom>
+        </p:spPr>
+        <p:style>
+          <a:lnRef idx="2">
+            <a:schemeClr val="accent3">
+              <a:shade val="50000"/>
+            </a:schemeClr>
+          </a:lnRef>
+          <a:fillRef idx="1">
+            <a:schemeClr val="accent3"/>
+          </a:fillRef>
+          <a:effectRef idx="0">
+            <a:schemeClr val="accent3"/>
+          </a:effectRef>
+          <a:fontRef idx="minor">
+            <a:schemeClr val="lt1"/>
+          </a:fontRef>
+        </p:style>
+        <p:txBody>
+          <a:bodyPr rtlCol="0" anchor="ctr"/>
+          <a:lstStyle/>
+          <a:p>
+            <a:pPr algn="ctr"/>
+            <a:r>
+              <a:rPr lang="de-DE" dirty="0" err="1"/>
+              <a:t>model</a:t>
+            </a:r>
+            <a:endParaRPr lang="de-DE" dirty="0"/>
+          </a:p>
+        </p:txBody>
+      </p:sp>
+      <p:sp>
+        <p:nvSpPr>
+          <p:cNvPr id="8" name="Rounded Rectangle 7">
+            <a:extLst>
+              <a:ext uri="{FF2B5EF4-FFF2-40B4-BE49-F238E27FC236}">
+                <a16:creationId xmlns:a16="http://schemas.microsoft.com/office/drawing/2014/main" id="{5BFF1CDB-EC94-2A45-A7CD-7C1384AB33BA}"/>
+              </a:ext>
+            </a:extLst>
+          </p:cNvPr>
+          <p:cNvSpPr/>
+          <p:nvPr/>
+        </p:nvSpPr>
+        <p:spPr>
+          <a:xfrm>
+            <a:off x="4844466" y="4496441"/>
+            <a:ext cx="1311563" cy="554182"/>
+          </a:xfrm>
+          <a:prstGeom prst="roundRect">
+            <a:avLst/>
+          </a:prstGeom>
+        </p:spPr>
+        <p:style>
+          <a:lnRef idx="2">
+            <a:schemeClr val="accent6">
+              <a:shade val="50000"/>
+            </a:schemeClr>
+          </a:lnRef>
+          <a:fillRef idx="1">
+            <a:schemeClr val="accent6"/>
+          </a:fillRef>
+          <a:effectRef idx="0">
+            <a:schemeClr val="accent6"/>
+          </a:effectRef>
+          <a:fontRef idx="minor">
+            <a:schemeClr val="lt1"/>
+          </a:fontRef>
+        </p:style>
+        <p:txBody>
+          <a:bodyPr rtlCol="0" anchor="ctr"/>
+          <a:lstStyle/>
+          <a:p>
+            <a:pPr algn="ctr"/>
+            <a:r>
+              <a:rPr lang="de-DE" dirty="0" err="1"/>
+              <a:t>view</a:t>
+            </a:r>
+            <a:endParaRPr lang="de-DE" dirty="0"/>
+          </a:p>
+        </p:txBody>
+      </p:sp>
+      <p:cxnSp>
+        <p:nvCxnSpPr>
+          <p:cNvPr id="9" name="Curved Connector 8">
+            <a:extLst>
+              <a:ext uri="{FF2B5EF4-FFF2-40B4-BE49-F238E27FC236}">
+                <a16:creationId xmlns:a16="http://schemas.microsoft.com/office/drawing/2014/main" id="{E3ABD28C-B6B5-D946-98C9-20C73BD24F0F}"/>
+              </a:ext>
+            </a:extLst>
+          </p:cNvPr>
+          <p:cNvCxnSpPr>
+            <a:cxnSpLocks/>
+            <a:stCxn id="7" idx="2"/>
+            <a:endCxn id="8" idx="3"/>
+          </p:cNvCxnSpPr>
+          <p:nvPr/>
+        </p:nvCxnSpPr>
+        <p:spPr>
+          <a:xfrm rot="5400000">
+            <a:off x="6743169" y="3441813"/>
+            <a:ext cx="744580" cy="1918859"/>
+          </a:xfrm>
+          <a:prstGeom prst="curvedConnector2">
+            <a:avLst/>
+          </a:prstGeom>
+          <a:ln>
+            <a:tailEnd type="triangle"/>
+          </a:ln>
+        </p:spPr>
+        <p:style>
+          <a:lnRef idx="1">
+            <a:schemeClr val="accent1"/>
+          </a:lnRef>
+          <a:fillRef idx="0">
+            <a:schemeClr val="accent1"/>
+          </a:fillRef>
+          <a:effectRef idx="0">
+            <a:schemeClr val="accent1"/>
+          </a:effectRef>
+          <a:fontRef idx="minor">
+            <a:schemeClr val="tx1"/>
+          </a:fontRef>
+        </p:style>
+      </p:cxnSp>
+      <p:cxnSp>
+        <p:nvCxnSpPr>
+          <p:cNvPr id="10" name="Curved Connector 9">
+            <a:extLst>
+              <a:ext uri="{FF2B5EF4-FFF2-40B4-BE49-F238E27FC236}">
+                <a16:creationId xmlns:a16="http://schemas.microsoft.com/office/drawing/2014/main" id="{79C1B0B6-9A90-A544-A4A9-AC9C10EA340F}"/>
+              </a:ext>
+            </a:extLst>
+          </p:cNvPr>
+          <p:cNvCxnSpPr>
+            <a:cxnSpLocks/>
+            <a:stCxn id="4" idx="0"/>
+            <a:endCxn id="5" idx="1"/>
+          </p:cNvCxnSpPr>
+          <p:nvPr/>
+        </p:nvCxnSpPr>
+        <p:spPr>
+          <a:xfrm rot="5400000" flipH="1" flipV="1">
+            <a:off x="3413937" y="2013295"/>
+            <a:ext cx="858654" cy="2002405"/>
+          </a:xfrm>
+          <a:prstGeom prst="curvedConnector2">
+            <a:avLst/>
+          </a:prstGeom>
+          <a:ln>
+            <a:tailEnd type="triangle"/>
+          </a:ln>
+        </p:spPr>
+        <p:style>
+          <a:lnRef idx="1">
+            <a:schemeClr val="accent1"/>
+          </a:lnRef>
+          <a:fillRef idx="0">
+            <a:schemeClr val="accent1"/>
+          </a:fillRef>
+          <a:effectRef idx="0">
+            <a:schemeClr val="accent1"/>
+          </a:effectRef>
+          <a:fontRef idx="minor">
+            <a:schemeClr val="tx1"/>
+          </a:fontRef>
+        </p:style>
+      </p:cxnSp>
+      <p:cxnSp>
+        <p:nvCxnSpPr>
+          <p:cNvPr id="11" name="Curved Connector 10">
+            <a:extLst>
+              <a:ext uri="{FF2B5EF4-FFF2-40B4-BE49-F238E27FC236}">
+                <a16:creationId xmlns:a16="http://schemas.microsoft.com/office/drawing/2014/main" id="{8665E169-B6CD-D74A-A7AD-E9F6D721706B}"/>
+              </a:ext>
+            </a:extLst>
+          </p:cNvPr>
+          <p:cNvCxnSpPr>
+            <a:cxnSpLocks/>
+            <a:stCxn id="8" idx="1"/>
+            <a:endCxn id="4" idx="2"/>
+          </p:cNvCxnSpPr>
+          <p:nvPr/>
+        </p:nvCxnSpPr>
+        <p:spPr>
+          <a:xfrm rot="10800000">
+            <a:off x="2842062" y="3998006"/>
+            <a:ext cx="2002404" cy="775526"/>
+          </a:xfrm>
+          <a:prstGeom prst="curvedConnector2">
+            <a:avLst/>
+          </a:prstGeom>
+          <a:ln>
+            <a:tailEnd type="triangle"/>
+          </a:ln>
+        </p:spPr>
+        <p:style>
+          <a:lnRef idx="1">
+            <a:schemeClr val="accent1"/>
+          </a:lnRef>
+          <a:fillRef idx="0">
+            <a:schemeClr val="accent1"/>
+          </a:fillRef>
+          <a:effectRef idx="0">
+            <a:schemeClr val="accent1"/>
+          </a:effectRef>
+          <a:fontRef idx="minor">
+            <a:schemeClr val="tx1"/>
+          </a:fontRef>
+        </p:style>
+      </p:cxnSp>
+      <p:cxnSp>
+        <p:nvCxnSpPr>
+          <p:cNvPr id="14" name="Curved Connector 13">
+            <a:extLst>
+              <a:ext uri="{FF2B5EF4-FFF2-40B4-BE49-F238E27FC236}">
+                <a16:creationId xmlns:a16="http://schemas.microsoft.com/office/drawing/2014/main" id="{D5A67CF3-2CD8-E343-B1C6-B68DD5019DF9}"/>
+              </a:ext>
+            </a:extLst>
+          </p:cNvPr>
+          <p:cNvCxnSpPr>
+            <a:cxnSpLocks/>
+            <a:endCxn id="7" idx="0"/>
+          </p:cNvCxnSpPr>
+          <p:nvPr/>
+        </p:nvCxnSpPr>
+        <p:spPr>
+          <a:xfrm>
+            <a:off x="6182159" y="2585170"/>
+            <a:ext cx="1892729" cy="889600"/>
+          </a:xfrm>
+          <a:prstGeom prst="curvedConnector2">
+            <a:avLst/>
+          </a:prstGeom>
+          <a:ln>
+            <a:tailEnd type="triangle"/>
+          </a:ln>
+        </p:spPr>
+        <p:style>
+          <a:lnRef idx="1">
+            <a:schemeClr val="accent1"/>
+          </a:lnRef>
+          <a:fillRef idx="0">
+            <a:schemeClr val="accent1"/>
+          </a:fillRef>
+          <a:effectRef idx="0">
+            <a:schemeClr val="accent1"/>
+          </a:effectRef>
+          <a:fontRef idx="minor">
+            <a:schemeClr val="tx1"/>
+          </a:fontRef>
+        </p:style>
+      </p:cxnSp>
+      <p:sp>
+        <p:nvSpPr>
+          <p:cNvPr id="15" name="TextBox 14">
+            <a:extLst>
+              <a:ext uri="{FF2B5EF4-FFF2-40B4-BE49-F238E27FC236}">
+                <a16:creationId xmlns:a16="http://schemas.microsoft.com/office/drawing/2014/main" id="{ED187C96-F37D-3E45-837B-3C138529034E}"/>
+              </a:ext>
+            </a:extLst>
+          </p:cNvPr>
+          <p:cNvSpPr txBox="1"/>
+          <p:nvPr/>
+        </p:nvSpPr>
+        <p:spPr>
+          <a:xfrm>
+            <a:off x="3406845" y="2431280"/>
+            <a:ext cx="872836" cy="307777"/>
+          </a:xfrm>
+          <a:prstGeom prst="rect">
+            <a:avLst/>
+          </a:prstGeom>
+          <a:noFill/>
+        </p:spPr>
+        <p:txBody>
+          <a:bodyPr wrap="square" rtlCol="0">
+            <a:spAutoFit/>
+          </a:bodyPr>
+          <a:lstStyle/>
+          <a:p>
+            <a:r>
+              <a:rPr lang="de-DE" sz="1400" dirty="0" err="1"/>
+              <a:t>uses</a:t>
+            </a:r>
+            <a:endParaRPr lang="de-DE" sz="1400" dirty="0"/>
+          </a:p>
+        </p:txBody>
+      </p:sp>
+      <p:sp>
+        <p:nvSpPr>
+          <p:cNvPr id="16" name="TextBox 15">
+            <a:extLst>
+              <a:ext uri="{FF2B5EF4-FFF2-40B4-BE49-F238E27FC236}">
+                <a16:creationId xmlns:a16="http://schemas.microsoft.com/office/drawing/2014/main" id="{0CD36CC6-4D1E-B64C-BAC7-4BB8203B9E3F}"/>
+              </a:ext>
+            </a:extLst>
+          </p:cNvPr>
+          <p:cNvSpPr txBox="1"/>
+          <p:nvPr/>
+        </p:nvSpPr>
+        <p:spPr>
+          <a:xfrm>
+            <a:off x="6961903" y="2431281"/>
+            <a:ext cx="1196533" cy="307777"/>
+          </a:xfrm>
+          <a:prstGeom prst="rect">
+            <a:avLst/>
+          </a:prstGeom>
+          <a:noFill/>
+        </p:spPr>
+        <p:txBody>
+          <a:bodyPr wrap="square" rtlCol="0">
+            <a:spAutoFit/>
+          </a:bodyPr>
+          <a:lstStyle/>
+          <a:p>
+            <a:r>
+              <a:rPr lang="de-DE" sz="1400" dirty="0" err="1"/>
+              <a:t>manipulates</a:t>
+            </a:r>
+            <a:endParaRPr lang="de-DE" sz="1400" dirty="0"/>
+          </a:p>
+        </p:txBody>
+      </p:sp>
+      <p:sp>
+        <p:nvSpPr>
+          <p:cNvPr id="17" name="TextBox 16">
+            <a:extLst>
+              <a:ext uri="{FF2B5EF4-FFF2-40B4-BE49-F238E27FC236}">
+                <a16:creationId xmlns:a16="http://schemas.microsoft.com/office/drawing/2014/main" id="{E269781C-8905-F341-A325-4541109E7316}"/>
+              </a:ext>
+            </a:extLst>
+          </p:cNvPr>
+          <p:cNvSpPr txBox="1"/>
+          <p:nvPr/>
+        </p:nvSpPr>
+        <p:spPr>
+          <a:xfrm>
+            <a:off x="6982688" y="4619643"/>
+            <a:ext cx="872836" cy="307777"/>
+          </a:xfrm>
+          <a:prstGeom prst="rect">
+            <a:avLst/>
+          </a:prstGeom>
+          <a:noFill/>
+        </p:spPr>
+        <p:txBody>
+          <a:bodyPr wrap="square" rtlCol="0">
+            <a:spAutoFit/>
+          </a:bodyPr>
+          <a:lstStyle/>
+          <a:p>
+            <a:r>
+              <a:rPr lang="de-DE" sz="1400" dirty="0"/>
+              <a:t>update</a:t>
+            </a:r>
+          </a:p>
+        </p:txBody>
+      </p:sp>
+      <p:sp>
+        <p:nvSpPr>
+          <p:cNvPr id="44" name="TextBox 43">
+            <a:extLst>
+              <a:ext uri="{FF2B5EF4-FFF2-40B4-BE49-F238E27FC236}">
+                <a16:creationId xmlns:a16="http://schemas.microsoft.com/office/drawing/2014/main" id="{50512E6B-C0DC-4949-ACA2-7926F661F2FE}"/>
+              </a:ext>
+            </a:extLst>
+          </p:cNvPr>
+          <p:cNvSpPr txBox="1"/>
+          <p:nvPr/>
+        </p:nvSpPr>
+        <p:spPr>
+          <a:xfrm>
+            <a:off x="3406845" y="4619643"/>
+            <a:ext cx="872836" cy="307777"/>
+          </a:xfrm>
+          <a:prstGeom prst="rect">
+            <a:avLst/>
+          </a:prstGeom>
+          <a:noFill/>
+        </p:spPr>
+        <p:txBody>
+          <a:bodyPr wrap="square" rtlCol="0">
+            <a:spAutoFit/>
+          </a:bodyPr>
+          <a:lstStyle/>
+          <a:p>
+            <a:r>
+              <a:rPr lang="de-DE" sz="1400" dirty="0" err="1"/>
+              <a:t>sees</a:t>
+            </a:r>
+            <a:endParaRPr lang="de-DE" sz="1400" dirty="0"/>
+          </a:p>
+        </p:txBody>
+      </p:sp>
+    </p:spTree>
+    <p:extLst>
+      <p:ext uri="{BB962C8B-B14F-4D97-AF65-F5344CB8AC3E}">
+        <p14:creationId xmlns:p14="http://schemas.microsoft.com/office/powerpoint/2010/main" val="2536110908"/>
       </p:ext>
     </p:extLst>
   </p:cSld>
@@ -5318,4 +9040,299 @@
     </a:ext>
   </a:extLst>
 </a:theme>
+</file>
+
+<file path=ppt/theme/theme2.xml><?xml version="1.0" encoding="utf-8"?>
+<a:theme xmlns:a="http://schemas.openxmlformats.org/drawingml/2006/main" name="Office Theme">
+  <a:themeElements>
+    <a:clrScheme name="Office">
+      <a:dk1>
+        <a:sysClr val="windowText" lastClr="000000"/>
+      </a:dk1>
+      <a:lt1>
+        <a:sysClr val="window" lastClr="FFFFFF"/>
+      </a:lt1>
+      <a:dk2>
+        <a:srgbClr val="44546A"/>
+      </a:dk2>
+      <a:lt2>
+        <a:srgbClr val="E7E6E6"/>
+      </a:lt2>
+      <a:accent1>
+        <a:srgbClr val="4472C4"/>
+      </a:accent1>
+      <a:accent2>
+        <a:srgbClr val="ED7D31"/>
+      </a:accent2>
+      <a:accent3>
+        <a:srgbClr val="A5A5A5"/>
+      </a:accent3>
+      <a:accent4>
+        <a:srgbClr val="FFC000"/>
+      </a:accent4>
+      <a:accent5>
+        <a:srgbClr val="5B9BD5"/>
+      </a:accent5>
+      <a:accent6>
+        <a:srgbClr val="70AD47"/>
+      </a:accent6>
+      <a:hlink>
+        <a:srgbClr val="0563C1"/>
+      </a:hlink>
+      <a:folHlink>
+        <a:srgbClr val="954F72"/>
+      </a:folHlink>
+    </a:clrScheme>
+    <a:fontScheme name="Office">
+      <a:majorFont>
+        <a:latin typeface="Calibri Light" panose="020F0302020204030204"/>
+        <a:ea typeface=""/>
+        <a:cs typeface=""/>
+        <a:font script="Jpan" typeface="游ゴシック Light"/>
+        <a:font script="Hang" typeface="맑은 고딕"/>
+        <a:font script="Hans" typeface="等线 Light"/>
+        <a:font script="Hant" typeface="新細明體"/>
+        <a:font script="Arab" typeface="Times New Roman"/>
+        <a:font script="Hebr" typeface="Times New Roman"/>
+        <a:font script="Thai" typeface="Angsana New"/>
+        <a:font script="Ethi" typeface="Nyala"/>
+        <a:font script="Beng" typeface="Vrinda"/>
+        <a:font script="Gujr" typeface="Shruti"/>
+        <a:font script="Khmr" typeface="MoolBoran"/>
+        <a:font script="Knda" typeface="Tunga"/>
+        <a:font script="Guru" typeface="Raavi"/>
+        <a:font script="Cans" typeface="Euphemia"/>
+        <a:font script="Cher" typeface="Plantagenet Cherokee"/>
+        <a:font script="Yiii" typeface="Microsoft Yi Baiti"/>
+        <a:font script="Tibt" typeface="Microsoft Himalaya"/>
+        <a:font script="Thaa" typeface="MV Boli"/>
+        <a:font script="Deva" typeface="Mangal"/>
+        <a:font script="Telu" typeface="Gautami"/>
+        <a:font script="Taml" typeface="Latha"/>
+        <a:font script="Syrc" typeface="Estrangelo Edessa"/>
+        <a:font script="Orya" typeface="Kalinga"/>
+        <a:font script="Mlym" typeface="Kartika"/>
+        <a:font script="Laoo" typeface="DokChampa"/>
+        <a:font script="Sinh" typeface="Iskoola Pota"/>
+        <a:font script="Mong" typeface="Mongolian Baiti"/>
+        <a:font script="Viet" typeface="Times New Roman"/>
+        <a:font script="Uigh" typeface="Microsoft Uighur"/>
+        <a:font script="Geor" typeface="Sylfaen"/>
+        <a:font script="Armn" typeface="Arial"/>
+        <a:font script="Bugi" typeface="Leelawadee UI"/>
+        <a:font script="Bopo" typeface="Microsoft JhengHei"/>
+        <a:font script="Java" typeface="Javanese Text"/>
+        <a:font script="Lisu" typeface="Segoe UI"/>
+        <a:font script="Mymr" typeface="Myanmar Text"/>
+        <a:font script="Nkoo" typeface="Ebrima"/>
+        <a:font script="Olck" typeface="Nirmala UI"/>
+        <a:font script="Osma" typeface="Ebrima"/>
+        <a:font script="Phag" typeface="Phagspa"/>
+        <a:font script="Syrn" typeface="Estrangelo Edessa"/>
+        <a:font script="Syrj" typeface="Estrangelo Edessa"/>
+        <a:font script="Syre" typeface="Estrangelo Edessa"/>
+        <a:font script="Sora" typeface="Nirmala UI"/>
+        <a:font script="Tale" typeface="Microsoft Tai Le"/>
+        <a:font script="Talu" typeface="Microsoft New Tai Lue"/>
+        <a:font script="Tfng" typeface="Ebrima"/>
+      </a:majorFont>
+      <a:minorFont>
+        <a:latin typeface="Calibri" panose="020F0502020204030204"/>
+        <a:ea typeface=""/>
+        <a:cs typeface=""/>
+        <a:font script="Jpan" typeface="游ゴシック"/>
+        <a:font script="Hang" typeface="맑은 고딕"/>
+        <a:font script="Hans" typeface="等线"/>
+        <a:font script="Hant" typeface="新細明體"/>
+        <a:font script="Arab" typeface="Arial"/>
+        <a:font script="Hebr" typeface="Arial"/>
+        <a:font script="Thai" typeface="Cordia New"/>
+        <a:font script="Ethi" typeface="Nyala"/>
+        <a:font script="Beng" typeface="Vrinda"/>
+        <a:font script="Gujr" typeface="Shruti"/>
+        <a:font script="Khmr" typeface="DaunPenh"/>
+        <a:font script="Knda" typeface="Tunga"/>
+        <a:font script="Guru" typeface="Raavi"/>
+        <a:font script="Cans" typeface="Euphemia"/>
+        <a:font script="Cher" typeface="Plantagenet Cherokee"/>
+        <a:font script="Yiii" typeface="Microsoft Yi Baiti"/>
+        <a:font script="Tibt" typeface="Microsoft Himalaya"/>
+        <a:font script="Thaa" typeface="MV Boli"/>
+        <a:font script="Deva" typeface="Mangal"/>
+        <a:font script="Telu" typeface="Gautami"/>
+        <a:font script="Taml" typeface="Latha"/>
+        <a:font script="Syrc" typeface="Estrangelo Edessa"/>
+        <a:font script="Orya" typeface="Kalinga"/>
+        <a:font script="Mlym" typeface="Kartika"/>
+        <a:font script="Laoo" typeface="DokChampa"/>
+        <a:font script="Sinh" typeface="Iskoola Pota"/>
+        <a:font script="Mong" typeface="Mongolian Baiti"/>
+        <a:font script="Viet" typeface="Arial"/>
+        <a:font script="Uigh" typeface="Microsoft Uighur"/>
+        <a:font script="Geor" typeface="Sylfaen"/>
+        <a:font script="Armn" typeface="Arial"/>
+        <a:font script="Bugi" typeface="Leelawadee UI"/>
+        <a:font script="Bopo" typeface="Microsoft JhengHei"/>
+        <a:font script="Java" typeface="Javanese Text"/>
+        <a:font script="Lisu" typeface="Segoe UI"/>
+        <a:font script="Mymr" typeface="Myanmar Text"/>
+        <a:font script="Nkoo" typeface="Ebrima"/>
+        <a:font script="Olck" typeface="Nirmala UI"/>
+        <a:font script="Osma" typeface="Ebrima"/>
+        <a:font script="Phag" typeface="Phagspa"/>
+        <a:font script="Syrn" typeface="Estrangelo Edessa"/>
+        <a:font script="Syrj" typeface="Estrangelo Edessa"/>
+        <a:font script="Syre" typeface="Estrangelo Edessa"/>
+        <a:font script="Sora" typeface="Nirmala UI"/>
+        <a:font script="Tale" typeface="Microsoft Tai Le"/>
+        <a:font script="Talu" typeface="Microsoft New Tai Lue"/>
+        <a:font script="Tfng" typeface="Ebrima"/>
+      </a:minorFont>
+    </a:fontScheme>
+    <a:fmtScheme name="Office">
+      <a:fillStyleLst>
+        <a:solidFill>
+          <a:schemeClr val="phClr"/>
+        </a:solidFill>
+        <a:gradFill rotWithShape="1">
+          <a:gsLst>
+            <a:gs pos="0">
+              <a:schemeClr val="phClr">
+                <a:lumMod val="110000"/>
+                <a:satMod val="105000"/>
+                <a:tint val="67000"/>
+              </a:schemeClr>
+            </a:gs>
+            <a:gs pos="50000">
+              <a:schemeClr val="phClr">
+                <a:lumMod val="105000"/>
+                <a:satMod val="103000"/>
+                <a:tint val="73000"/>
+              </a:schemeClr>
+            </a:gs>
+            <a:gs pos="100000">
+              <a:schemeClr val="phClr">
+                <a:lumMod val="105000"/>
+                <a:satMod val="109000"/>
+                <a:tint val="81000"/>
+              </a:schemeClr>
+            </a:gs>
+          </a:gsLst>
+          <a:lin ang="5400000" scaled="0"/>
+        </a:gradFill>
+        <a:gradFill rotWithShape="1">
+          <a:gsLst>
+            <a:gs pos="0">
+              <a:schemeClr val="phClr">
+                <a:satMod val="103000"/>
+                <a:lumMod val="102000"/>
+                <a:tint val="94000"/>
+              </a:schemeClr>
+            </a:gs>
+            <a:gs pos="50000">
+              <a:schemeClr val="phClr">
+                <a:satMod val="110000"/>
+                <a:lumMod val="100000"/>
+                <a:shade val="100000"/>
+              </a:schemeClr>
+            </a:gs>
+            <a:gs pos="100000">
+              <a:schemeClr val="phClr">
+                <a:lumMod val="99000"/>
+                <a:satMod val="120000"/>
+                <a:shade val="78000"/>
+              </a:schemeClr>
+            </a:gs>
+          </a:gsLst>
+          <a:lin ang="5400000" scaled="0"/>
+        </a:gradFill>
+      </a:fillStyleLst>
+      <a:lnStyleLst>
+        <a:ln w="6350" cap="flat" cmpd="sng" algn="ctr">
+          <a:solidFill>
+            <a:schemeClr val="phClr"/>
+          </a:solidFill>
+          <a:prstDash val="solid"/>
+          <a:miter lim="800000"/>
+        </a:ln>
+        <a:ln w="12700" cap="flat" cmpd="sng" algn="ctr">
+          <a:solidFill>
+            <a:schemeClr val="phClr"/>
+          </a:solidFill>
+          <a:prstDash val="solid"/>
+          <a:miter lim="800000"/>
+        </a:ln>
+        <a:ln w="19050" cap="flat" cmpd="sng" algn="ctr">
+          <a:solidFill>
+            <a:schemeClr val="phClr"/>
+          </a:solidFill>
+          <a:prstDash val="solid"/>
+          <a:miter lim="800000"/>
+        </a:ln>
+      </a:lnStyleLst>
+      <a:effectStyleLst>
+        <a:effectStyle>
+          <a:effectLst/>
+        </a:effectStyle>
+        <a:effectStyle>
+          <a:effectLst/>
+        </a:effectStyle>
+        <a:effectStyle>
+          <a:effectLst>
+            <a:outerShdw blurRad="57150" dist="19050" dir="5400000" algn="ctr" rotWithShape="0">
+              <a:srgbClr val="000000">
+                <a:alpha val="63000"/>
+              </a:srgbClr>
+            </a:outerShdw>
+          </a:effectLst>
+        </a:effectStyle>
+      </a:effectStyleLst>
+      <a:bgFillStyleLst>
+        <a:solidFill>
+          <a:schemeClr val="phClr"/>
+        </a:solidFill>
+        <a:solidFill>
+          <a:schemeClr val="phClr">
+            <a:tint val="95000"/>
+            <a:satMod val="170000"/>
+          </a:schemeClr>
+        </a:solidFill>
+        <a:gradFill rotWithShape="1">
+          <a:gsLst>
+            <a:gs pos="0">
+              <a:schemeClr val="phClr">
+                <a:tint val="93000"/>
+                <a:satMod val="150000"/>
+                <a:shade val="98000"/>
+                <a:lumMod val="102000"/>
+              </a:schemeClr>
+            </a:gs>
+            <a:gs pos="50000">
+              <a:schemeClr val="phClr">
+                <a:tint val="98000"/>
+                <a:satMod val="130000"/>
+                <a:shade val="90000"/>
+                <a:lumMod val="103000"/>
+              </a:schemeClr>
+            </a:gs>
+            <a:gs pos="100000">
+              <a:schemeClr val="phClr">
+                <a:shade val="63000"/>
+                <a:satMod val="120000"/>
+              </a:schemeClr>
+            </a:gs>
+          </a:gsLst>
+          <a:lin ang="5400000" scaled="0"/>
+        </a:gradFill>
+      </a:bgFillStyleLst>
+    </a:fmtScheme>
+  </a:themeElements>
+  <a:objectDefaults/>
+  <a:extraClrSchemeLst/>
+  <a:extLst>
+    <a:ext uri="{05A4C25C-085E-4340-85A3-A5531E510DB2}">
+      <thm15:themeFamily xmlns:thm15="http://schemas.microsoft.com/office/thememl/2012/main" name="Office Theme" id="{62F939B6-93AF-4DB8-9C6B-D6C7DFDC589F}" vid="{4A3C46E8-61CC-4603-A589-7422A47A8E4A}"/>
+    </a:ext>
+  </a:extLst>
+</a:theme>
 </file>
</xml_diff>